<commit_message>
Gestion de projet 2
</commit_message>
<xml_diff>
--- a/doc/livrable_1/rapport/img/WBS + RACI.pptx
+++ b/doc/livrable_1/rapport/img/WBS + RACI.pptx
@@ -5,28 +5,13 @@
     <p:sldMasterId id="2147483659" r:id="rId1"/>
   </p:sldMasterIdLst>
   <p:notesMasterIdLst>
-    <p:notesMasterId r:id="rId5"/>
+    <p:notesMasterId r:id="rId3"/>
   </p:notesMasterIdLst>
   <p:sldIdLst>
-    <p:sldId id="256" r:id="rId2"/>
-    <p:sldId id="257" r:id="rId3"/>
-    <p:sldId id="258" r:id="rId4"/>
+    <p:sldId id="257" r:id="rId2"/>
   </p:sldIdLst>
   <p:sldSz cx="9144000" cy="5143500" type="screen16x9"/>
   <p:notesSz cx="6858000" cy="9144000"/>
-  <p:embeddedFontLst>
-    <p:embeddedFont>
-      <p:font typeface="Special Elite" panose="020B0604020202020204" charset="0"/>
-      <p:regular r:id="rId6"/>
-    </p:embeddedFont>
-    <p:embeddedFont>
-      <p:font typeface="Trebuchet MS" panose="020B0603020202020204" pitchFamily="34" charset="0"/>
-      <p:regular r:id="rId7"/>
-      <p:bold r:id="rId8"/>
-      <p:italic r:id="rId9"/>
-      <p:boldItalic r:id="rId10"/>
-    </p:embeddedFont>
-  </p:embeddedFontLst>
   <p:defaultTextStyle>
     <a:defPPr marR="0" lvl="0" algn="l" rtl="0">
       <a:lnSpc>
@@ -710,110 +695,6 @@
   <p:cSld>
     <p:spTree>
       <p:nvGrpSpPr>
-        <p:cNvPr id="1" name="Shape 50"/>
-        <p:cNvGrpSpPr/>
-        <p:nvPr/>
-      </p:nvGrpSpPr>
-      <p:grpSpPr>
-        <a:xfrm>
-          <a:off x="0" y="0"/>
-          <a:ext cx="0" cy="0"/>
-          <a:chOff x="0" y="0"/>
-          <a:chExt cx="0" cy="0"/>
-        </a:xfrm>
-      </p:grpSpPr>
-      <p:sp>
-        <p:nvSpPr>
-          <p:cNvPr id="51" name="Google Shape;51;g30f4a5e4f6_0_0:notes"/>
-          <p:cNvSpPr>
-            <a:spLocks noGrp="1" noRot="1" noChangeAspect="1"/>
-          </p:cNvSpPr>
-          <p:nvPr>
-            <p:ph type="sldImg" idx="2"/>
-          </p:nvPr>
-        </p:nvSpPr>
-        <p:spPr>
-          <a:xfrm>
-            <a:off x="381300" y="685800"/>
-            <a:ext cx="6096000" cy="3429000"/>
-          </a:xfrm>
-          <a:custGeom>
-            <a:avLst/>
-            <a:gdLst/>
-            <a:ahLst/>
-            <a:cxnLst/>
-            <a:rect l="l" t="t" r="r" b="b"/>
-            <a:pathLst>
-              <a:path w="120000" h="120000" extrusionOk="0">
-                <a:moveTo>
-                  <a:pt x="0" y="0"/>
-                </a:moveTo>
-                <a:lnTo>
-                  <a:pt x="120000" y="0"/>
-                </a:lnTo>
-                <a:lnTo>
-                  <a:pt x="120000" y="120000"/>
-                </a:lnTo>
-                <a:lnTo>
-                  <a:pt x="0" y="120000"/>
-                </a:lnTo>
-                <a:close/>
-              </a:path>
-            </a:pathLst>
-          </a:custGeom>
-        </p:spPr>
-      </p:sp>
-      <p:sp>
-        <p:nvSpPr>
-          <p:cNvPr id="52" name="Google Shape;52;g30f4a5e4f6_0_0:notes"/>
-          <p:cNvSpPr txBox="1">
-            <a:spLocks noGrp="1"/>
-          </p:cNvSpPr>
-          <p:nvPr>
-            <p:ph type="body" idx="1"/>
-          </p:nvPr>
-        </p:nvSpPr>
-        <p:spPr>
-          <a:xfrm>
-            <a:off x="685800" y="4343400"/>
-            <a:ext cx="5486400" cy="4114800"/>
-          </a:xfrm>
-          <a:prstGeom prst="rect">
-            <a:avLst/>
-          </a:prstGeom>
-        </p:spPr>
-        <p:txBody>
-          <a:bodyPr spcFirstLastPara="1" wrap="square" lIns="91425" tIns="91425" rIns="91425" bIns="91425" anchor="t" anchorCtr="0">
-            <a:noAutofit/>
-          </a:bodyPr>
-          <a:lstStyle/>
-          <a:p>
-            <a:pPr marL="0" lvl="0" indent="0" algn="l" rtl="0">
-              <a:spcBef>
-                <a:spcPts val="0"/>
-              </a:spcBef>
-              <a:spcAft>
-                <a:spcPts val="0"/>
-              </a:spcAft>
-              <a:buNone/>
-            </a:pPr>
-            <a:endParaRPr/>
-          </a:p>
-        </p:txBody>
-      </p:sp>
-    </p:spTree>
-  </p:cSld>
-  <p:clrMapOvr>
-    <a:masterClrMapping/>
-  </p:clrMapOvr>
-</p:notes>
-</file>
-
-<file path=ppt/notesSlides/notesSlide2.xml><?xml version="1.0" encoding="utf-8"?>
-<p:notes xmlns:a="http://schemas.openxmlformats.org/drawingml/2006/main" xmlns:r="http://schemas.openxmlformats.org/officeDocument/2006/relationships" xmlns:p="http://schemas.openxmlformats.org/presentationml/2006/main" showMasterSp="0" showMasterPhAnim="0">
-  <p:cSld>
-    <p:spTree>
-      <p:nvGrpSpPr>
         <p:cNvPr id="1" name="Shape 62"/>
         <p:cNvGrpSpPr/>
         <p:nvPr/>
@@ -913,110 +794,6 @@
 </p:notes>
 </file>
 
-<file path=ppt/notesSlides/notesSlide3.xml><?xml version="1.0" encoding="utf-8"?>
-<p:notes xmlns:a="http://schemas.openxmlformats.org/drawingml/2006/main" xmlns:r="http://schemas.openxmlformats.org/officeDocument/2006/relationships" xmlns:p="http://schemas.openxmlformats.org/presentationml/2006/main" showMasterSp="0" showMasterPhAnim="0">
-  <p:cSld>
-    <p:spTree>
-      <p:nvGrpSpPr>
-        <p:cNvPr id="1" name="Shape 118"/>
-        <p:cNvGrpSpPr/>
-        <p:nvPr/>
-      </p:nvGrpSpPr>
-      <p:grpSpPr>
-        <a:xfrm>
-          <a:off x="0" y="0"/>
-          <a:ext cx="0" cy="0"/>
-          <a:chOff x="0" y="0"/>
-          <a:chExt cx="0" cy="0"/>
-        </a:xfrm>
-      </p:grpSpPr>
-      <p:sp>
-        <p:nvSpPr>
-          <p:cNvPr id="119" name="Google Shape;119;g30f4a5e4f6_0_98:notes"/>
-          <p:cNvSpPr>
-            <a:spLocks noGrp="1" noRot="1" noChangeAspect="1"/>
-          </p:cNvSpPr>
-          <p:nvPr>
-            <p:ph type="sldImg" idx="2"/>
-          </p:nvPr>
-        </p:nvSpPr>
-        <p:spPr>
-          <a:xfrm>
-            <a:off x="381000" y="685800"/>
-            <a:ext cx="6096000" cy="3429000"/>
-          </a:xfrm>
-          <a:custGeom>
-            <a:avLst/>
-            <a:gdLst/>
-            <a:ahLst/>
-            <a:cxnLst/>
-            <a:rect l="l" t="t" r="r" b="b"/>
-            <a:pathLst>
-              <a:path w="120000" h="120000" extrusionOk="0">
-                <a:moveTo>
-                  <a:pt x="0" y="0"/>
-                </a:moveTo>
-                <a:lnTo>
-                  <a:pt x="120000" y="0"/>
-                </a:lnTo>
-                <a:lnTo>
-                  <a:pt x="120000" y="120000"/>
-                </a:lnTo>
-                <a:lnTo>
-                  <a:pt x="0" y="120000"/>
-                </a:lnTo>
-                <a:close/>
-              </a:path>
-            </a:pathLst>
-          </a:custGeom>
-        </p:spPr>
-      </p:sp>
-      <p:sp>
-        <p:nvSpPr>
-          <p:cNvPr id="120" name="Google Shape;120;g30f4a5e4f6_0_98:notes"/>
-          <p:cNvSpPr txBox="1">
-            <a:spLocks noGrp="1"/>
-          </p:cNvSpPr>
-          <p:nvPr>
-            <p:ph type="body" idx="1"/>
-          </p:nvPr>
-        </p:nvSpPr>
-        <p:spPr>
-          <a:xfrm>
-            <a:off x="685800" y="4343400"/>
-            <a:ext cx="5486400" cy="4114800"/>
-          </a:xfrm>
-          <a:prstGeom prst="rect">
-            <a:avLst/>
-          </a:prstGeom>
-        </p:spPr>
-        <p:txBody>
-          <a:bodyPr spcFirstLastPara="1" wrap="square" lIns="91425" tIns="91425" rIns="91425" bIns="91425" anchor="t" anchorCtr="0">
-            <a:noAutofit/>
-          </a:bodyPr>
-          <a:lstStyle/>
-          <a:p>
-            <a:pPr marL="0" lvl="0" indent="0" algn="l" rtl="0">
-              <a:spcBef>
-                <a:spcPts val="0"/>
-              </a:spcBef>
-              <a:spcAft>
-                <a:spcPts val="0"/>
-              </a:spcAft>
-              <a:buNone/>
-            </a:pPr>
-            <a:endParaRPr/>
-          </a:p>
-        </p:txBody>
-      </p:sp>
-    </p:spTree>
-  </p:cSld>
-  <p:clrMapOvr>
-    <a:masterClrMapping/>
-  </p:clrMapOvr>
-</p:notes>
-</file>
-
 <file path=ppt/slideLayouts/slideLayout1.xml><?xml version="1.0" encoding="utf-8"?>
 <p:sldLayout xmlns:a="http://schemas.openxmlformats.org/drawingml/2006/main" xmlns:r="http://schemas.openxmlformats.org/officeDocument/2006/relationships" xmlns:p="http://schemas.openxmlformats.org/presentationml/2006/main" matchingName="Title slide" type="title">
   <p:cSld name="TITLE">
@@ -1407,370 +1184,6 @@
 </file>
 
 <file path=ppt/slideLayouts/slideLayout10.xml><?xml version="1.0" encoding="utf-8"?>
-<p:sldLayout xmlns:a="http://schemas.openxmlformats.org/drawingml/2006/main" xmlns:r="http://schemas.openxmlformats.org/officeDocument/2006/relationships" xmlns:p="http://schemas.openxmlformats.org/presentationml/2006/main" matchingName="Big number">
-  <p:cSld name="BIG_NUMBER">
-    <p:spTree>
-      <p:nvGrpSpPr>
-        <p:cNvPr id="1" name="Shape 44"/>
-        <p:cNvGrpSpPr/>
-        <p:nvPr/>
-      </p:nvGrpSpPr>
-      <p:grpSpPr>
-        <a:xfrm>
-          <a:off x="0" y="0"/>
-          <a:ext cx="0" cy="0"/>
-          <a:chOff x="0" y="0"/>
-          <a:chExt cx="0" cy="0"/>
-        </a:xfrm>
-      </p:grpSpPr>
-      <p:sp>
-        <p:nvSpPr>
-          <p:cNvPr id="45" name="Google Shape;45;p11"/>
-          <p:cNvSpPr txBox="1">
-            <a:spLocks noGrp="1"/>
-          </p:cNvSpPr>
-          <p:nvPr>
-            <p:ph type="title" hasCustomPrompt="1"/>
-          </p:nvPr>
-        </p:nvSpPr>
-        <p:spPr>
-          <a:xfrm>
-            <a:off x="311700" y="1106125"/>
-            <a:ext cx="8520600" cy="1963500"/>
-          </a:xfrm>
-          <a:prstGeom prst="rect">
-            <a:avLst/>
-          </a:prstGeom>
-        </p:spPr>
-        <p:txBody>
-          <a:bodyPr spcFirstLastPara="1" wrap="square" lIns="91425" tIns="91425" rIns="91425" bIns="91425" anchor="b" anchorCtr="0">
-            <a:noAutofit/>
-          </a:bodyPr>
-          <a:lstStyle>
-            <a:lvl1pPr lvl="0" algn="ctr">
-              <a:spcBef>
-                <a:spcPts val="0"/>
-              </a:spcBef>
-              <a:spcAft>
-                <a:spcPts val="0"/>
-              </a:spcAft>
-              <a:buSzPts val="12000"/>
-              <a:buNone/>
-              <a:defRPr sz="12000"/>
-            </a:lvl1pPr>
-            <a:lvl2pPr lvl="1" algn="ctr">
-              <a:spcBef>
-                <a:spcPts val="0"/>
-              </a:spcBef>
-              <a:spcAft>
-                <a:spcPts val="0"/>
-              </a:spcAft>
-              <a:buSzPts val="12000"/>
-              <a:buNone/>
-              <a:defRPr sz="12000"/>
-            </a:lvl2pPr>
-            <a:lvl3pPr lvl="2" algn="ctr">
-              <a:spcBef>
-                <a:spcPts val="0"/>
-              </a:spcBef>
-              <a:spcAft>
-                <a:spcPts val="0"/>
-              </a:spcAft>
-              <a:buSzPts val="12000"/>
-              <a:buNone/>
-              <a:defRPr sz="12000"/>
-            </a:lvl3pPr>
-            <a:lvl4pPr lvl="3" algn="ctr">
-              <a:spcBef>
-                <a:spcPts val="0"/>
-              </a:spcBef>
-              <a:spcAft>
-                <a:spcPts val="0"/>
-              </a:spcAft>
-              <a:buSzPts val="12000"/>
-              <a:buNone/>
-              <a:defRPr sz="12000"/>
-            </a:lvl4pPr>
-            <a:lvl5pPr lvl="4" algn="ctr">
-              <a:spcBef>
-                <a:spcPts val="0"/>
-              </a:spcBef>
-              <a:spcAft>
-                <a:spcPts val="0"/>
-              </a:spcAft>
-              <a:buSzPts val="12000"/>
-              <a:buNone/>
-              <a:defRPr sz="12000"/>
-            </a:lvl5pPr>
-            <a:lvl6pPr lvl="5" algn="ctr">
-              <a:spcBef>
-                <a:spcPts val="0"/>
-              </a:spcBef>
-              <a:spcAft>
-                <a:spcPts val="0"/>
-              </a:spcAft>
-              <a:buSzPts val="12000"/>
-              <a:buNone/>
-              <a:defRPr sz="12000"/>
-            </a:lvl6pPr>
-            <a:lvl7pPr lvl="6" algn="ctr">
-              <a:spcBef>
-                <a:spcPts val="0"/>
-              </a:spcBef>
-              <a:spcAft>
-                <a:spcPts val="0"/>
-              </a:spcAft>
-              <a:buSzPts val="12000"/>
-              <a:buNone/>
-              <a:defRPr sz="12000"/>
-            </a:lvl7pPr>
-            <a:lvl8pPr lvl="7" algn="ctr">
-              <a:spcBef>
-                <a:spcPts val="0"/>
-              </a:spcBef>
-              <a:spcAft>
-                <a:spcPts val="0"/>
-              </a:spcAft>
-              <a:buSzPts val="12000"/>
-              <a:buNone/>
-              <a:defRPr sz="12000"/>
-            </a:lvl8pPr>
-            <a:lvl9pPr lvl="8" algn="ctr">
-              <a:spcBef>
-                <a:spcPts val="0"/>
-              </a:spcBef>
-              <a:spcAft>
-                <a:spcPts val="0"/>
-              </a:spcAft>
-              <a:buSzPts val="12000"/>
-              <a:buNone/>
-              <a:defRPr sz="12000"/>
-            </a:lvl9pPr>
-          </a:lstStyle>
-          <a:p>
-            <a:r>
-              <a:t>xx%</a:t>
-            </a:r>
-          </a:p>
-        </p:txBody>
-      </p:sp>
-      <p:sp>
-        <p:nvSpPr>
-          <p:cNvPr id="46" name="Google Shape;46;p11"/>
-          <p:cNvSpPr txBox="1">
-            <a:spLocks noGrp="1"/>
-          </p:cNvSpPr>
-          <p:nvPr>
-            <p:ph type="body" idx="1"/>
-          </p:nvPr>
-        </p:nvSpPr>
-        <p:spPr>
-          <a:xfrm>
-            <a:off x="311700" y="3152225"/>
-            <a:ext cx="8520600" cy="1300800"/>
-          </a:xfrm>
-          <a:prstGeom prst="rect">
-            <a:avLst/>
-          </a:prstGeom>
-        </p:spPr>
-        <p:txBody>
-          <a:bodyPr spcFirstLastPara="1" wrap="square" lIns="91425" tIns="91425" rIns="91425" bIns="91425" anchor="t" anchorCtr="0">
-            <a:noAutofit/>
-          </a:bodyPr>
-          <a:lstStyle>
-            <a:lvl1pPr marL="457200" lvl="0" indent="-342900" algn="ctr">
-              <a:spcBef>
-                <a:spcPts val="0"/>
-              </a:spcBef>
-              <a:spcAft>
-                <a:spcPts val="0"/>
-              </a:spcAft>
-              <a:buSzPts val="1800"/>
-              <a:buChar char="●"/>
-              <a:defRPr/>
-            </a:lvl1pPr>
-            <a:lvl2pPr marL="914400" lvl="1" indent="-317500" algn="ctr">
-              <a:spcBef>
-                <a:spcPts val="1600"/>
-              </a:spcBef>
-              <a:spcAft>
-                <a:spcPts val="0"/>
-              </a:spcAft>
-              <a:buSzPts val="1400"/>
-              <a:buChar char="○"/>
-              <a:defRPr/>
-            </a:lvl2pPr>
-            <a:lvl3pPr marL="1371600" lvl="2" indent="-317500" algn="ctr">
-              <a:spcBef>
-                <a:spcPts val="1600"/>
-              </a:spcBef>
-              <a:spcAft>
-                <a:spcPts val="0"/>
-              </a:spcAft>
-              <a:buSzPts val="1400"/>
-              <a:buChar char="■"/>
-              <a:defRPr/>
-            </a:lvl3pPr>
-            <a:lvl4pPr marL="1828800" lvl="3" indent="-317500" algn="ctr">
-              <a:spcBef>
-                <a:spcPts val="1600"/>
-              </a:spcBef>
-              <a:spcAft>
-                <a:spcPts val="0"/>
-              </a:spcAft>
-              <a:buSzPts val="1400"/>
-              <a:buChar char="●"/>
-              <a:defRPr/>
-            </a:lvl4pPr>
-            <a:lvl5pPr marL="2286000" lvl="4" indent="-317500" algn="ctr">
-              <a:spcBef>
-                <a:spcPts val="1600"/>
-              </a:spcBef>
-              <a:spcAft>
-                <a:spcPts val="0"/>
-              </a:spcAft>
-              <a:buSzPts val="1400"/>
-              <a:buChar char="○"/>
-              <a:defRPr/>
-            </a:lvl5pPr>
-            <a:lvl6pPr marL="2743200" lvl="5" indent="-317500" algn="ctr">
-              <a:spcBef>
-                <a:spcPts val="1600"/>
-              </a:spcBef>
-              <a:spcAft>
-                <a:spcPts val="0"/>
-              </a:spcAft>
-              <a:buSzPts val="1400"/>
-              <a:buChar char="■"/>
-              <a:defRPr/>
-            </a:lvl6pPr>
-            <a:lvl7pPr marL="3200400" lvl="6" indent="-317500" algn="ctr">
-              <a:spcBef>
-                <a:spcPts val="1600"/>
-              </a:spcBef>
-              <a:spcAft>
-                <a:spcPts val="0"/>
-              </a:spcAft>
-              <a:buSzPts val="1400"/>
-              <a:buChar char="●"/>
-              <a:defRPr/>
-            </a:lvl7pPr>
-            <a:lvl8pPr marL="3657600" lvl="7" indent="-317500" algn="ctr">
-              <a:spcBef>
-                <a:spcPts val="1600"/>
-              </a:spcBef>
-              <a:spcAft>
-                <a:spcPts val="0"/>
-              </a:spcAft>
-              <a:buSzPts val="1400"/>
-              <a:buChar char="○"/>
-              <a:defRPr/>
-            </a:lvl8pPr>
-            <a:lvl9pPr marL="4114800" lvl="8" indent="-317500" algn="ctr">
-              <a:spcBef>
-                <a:spcPts val="1600"/>
-              </a:spcBef>
-              <a:spcAft>
-                <a:spcPts val="1600"/>
-              </a:spcAft>
-              <a:buSzPts val="1400"/>
-              <a:buChar char="■"/>
-              <a:defRPr/>
-            </a:lvl9pPr>
-          </a:lstStyle>
-          <a:p>
-            <a:endParaRPr/>
-          </a:p>
-        </p:txBody>
-      </p:sp>
-      <p:sp>
-        <p:nvSpPr>
-          <p:cNvPr id="47" name="Google Shape;47;p11"/>
-          <p:cNvSpPr txBox="1">
-            <a:spLocks noGrp="1"/>
-          </p:cNvSpPr>
-          <p:nvPr>
-            <p:ph type="sldNum" idx="12"/>
-          </p:nvPr>
-        </p:nvSpPr>
-        <p:spPr>
-          <a:xfrm>
-            <a:off x="8472458" y="4663217"/>
-            <a:ext cx="548700" cy="393600"/>
-          </a:xfrm>
-          <a:prstGeom prst="rect">
-            <a:avLst/>
-          </a:prstGeom>
-        </p:spPr>
-        <p:txBody>
-          <a:bodyPr spcFirstLastPara="1" wrap="square" lIns="91425" tIns="91425" rIns="91425" bIns="91425" anchor="ctr" anchorCtr="0">
-            <a:noAutofit/>
-          </a:bodyPr>
-          <a:lstStyle>
-            <a:lvl1pPr lvl="0">
-              <a:buNone/>
-              <a:defRPr/>
-            </a:lvl1pPr>
-            <a:lvl2pPr lvl="1">
-              <a:buNone/>
-              <a:defRPr/>
-            </a:lvl2pPr>
-            <a:lvl3pPr lvl="2">
-              <a:buNone/>
-              <a:defRPr/>
-            </a:lvl3pPr>
-            <a:lvl4pPr lvl="3">
-              <a:buNone/>
-              <a:defRPr/>
-            </a:lvl4pPr>
-            <a:lvl5pPr lvl="4">
-              <a:buNone/>
-              <a:defRPr/>
-            </a:lvl5pPr>
-            <a:lvl6pPr lvl="5">
-              <a:buNone/>
-              <a:defRPr/>
-            </a:lvl6pPr>
-            <a:lvl7pPr lvl="6">
-              <a:buNone/>
-              <a:defRPr/>
-            </a:lvl7pPr>
-            <a:lvl8pPr lvl="7">
-              <a:buNone/>
-              <a:defRPr/>
-            </a:lvl8pPr>
-            <a:lvl9pPr lvl="8">
-              <a:buNone/>
-              <a:defRPr/>
-            </a:lvl9pPr>
-          </a:lstStyle>
-          <a:p>
-            <a:pPr marL="0" lvl="0" indent="0" algn="r" rtl="0">
-              <a:spcBef>
-                <a:spcPts val="0"/>
-              </a:spcBef>
-              <a:spcAft>
-                <a:spcPts val="0"/>
-              </a:spcAft>
-              <a:buNone/>
-            </a:pPr>
-            <a:fld id="{00000000-1234-1234-1234-123412341234}" type="slidenum">
-              <a:rPr lang="fr"/>
-              <a:t>‹N°›</a:t>
-            </a:fld>
-            <a:endParaRPr/>
-          </a:p>
-        </p:txBody>
-      </p:sp>
-    </p:spTree>
-  </p:cSld>
-  <p:clrMapOvr>
-    <a:masterClrMapping/>
-  </p:clrMapOvr>
-</p:sldLayout>
-</file>
-
-<file path=ppt/slideLayouts/slideLayout11.xml><?xml version="1.0" encoding="utf-8"?>
 <p:sldLayout xmlns:a="http://schemas.openxmlformats.org/drawingml/2006/main" xmlns:r="http://schemas.openxmlformats.org/officeDocument/2006/relationships" xmlns:p="http://schemas.openxmlformats.org/presentationml/2006/main" matchingName="Blank" type="blank">
   <p:cSld name="BLANK">
     <p:spTree>
@@ -2108,368 +1521,6 @@
 </file>
 
 <file path=ppt/slideLayouts/slideLayout3.xml><?xml version="1.0" encoding="utf-8"?>
-<p:sldLayout xmlns:a="http://schemas.openxmlformats.org/drawingml/2006/main" xmlns:r="http://schemas.openxmlformats.org/officeDocument/2006/relationships" xmlns:p="http://schemas.openxmlformats.org/presentationml/2006/main" matchingName="Title and body" type="tx">
-  <p:cSld name="TITLE_AND_BODY">
-    <p:spTree>
-      <p:nvGrpSpPr>
-        <p:cNvPr id="1" name="Shape 16"/>
-        <p:cNvGrpSpPr/>
-        <p:nvPr/>
-      </p:nvGrpSpPr>
-      <p:grpSpPr>
-        <a:xfrm>
-          <a:off x="0" y="0"/>
-          <a:ext cx="0" cy="0"/>
-          <a:chOff x="0" y="0"/>
-          <a:chExt cx="0" cy="0"/>
-        </a:xfrm>
-      </p:grpSpPr>
-      <p:sp>
-        <p:nvSpPr>
-          <p:cNvPr id="17" name="Google Shape;17;p4"/>
-          <p:cNvSpPr txBox="1">
-            <a:spLocks noGrp="1"/>
-          </p:cNvSpPr>
-          <p:nvPr>
-            <p:ph type="title"/>
-          </p:nvPr>
-        </p:nvSpPr>
-        <p:spPr>
-          <a:xfrm>
-            <a:off x="311700" y="445025"/>
-            <a:ext cx="8520600" cy="572700"/>
-          </a:xfrm>
-          <a:prstGeom prst="rect">
-            <a:avLst/>
-          </a:prstGeom>
-        </p:spPr>
-        <p:txBody>
-          <a:bodyPr spcFirstLastPara="1" wrap="square" lIns="91425" tIns="91425" rIns="91425" bIns="91425" anchor="t" anchorCtr="0">
-            <a:noAutofit/>
-          </a:bodyPr>
-          <a:lstStyle>
-            <a:lvl1pPr lvl="0">
-              <a:spcBef>
-                <a:spcPts val="0"/>
-              </a:spcBef>
-              <a:spcAft>
-                <a:spcPts val="0"/>
-              </a:spcAft>
-              <a:buSzPts val="2800"/>
-              <a:buNone/>
-              <a:defRPr/>
-            </a:lvl1pPr>
-            <a:lvl2pPr lvl="1">
-              <a:spcBef>
-                <a:spcPts val="0"/>
-              </a:spcBef>
-              <a:spcAft>
-                <a:spcPts val="0"/>
-              </a:spcAft>
-              <a:buSzPts val="2800"/>
-              <a:buNone/>
-              <a:defRPr/>
-            </a:lvl2pPr>
-            <a:lvl3pPr lvl="2">
-              <a:spcBef>
-                <a:spcPts val="0"/>
-              </a:spcBef>
-              <a:spcAft>
-                <a:spcPts val="0"/>
-              </a:spcAft>
-              <a:buSzPts val="2800"/>
-              <a:buNone/>
-              <a:defRPr/>
-            </a:lvl3pPr>
-            <a:lvl4pPr lvl="3">
-              <a:spcBef>
-                <a:spcPts val="0"/>
-              </a:spcBef>
-              <a:spcAft>
-                <a:spcPts val="0"/>
-              </a:spcAft>
-              <a:buSzPts val="2800"/>
-              <a:buNone/>
-              <a:defRPr/>
-            </a:lvl4pPr>
-            <a:lvl5pPr lvl="4">
-              <a:spcBef>
-                <a:spcPts val="0"/>
-              </a:spcBef>
-              <a:spcAft>
-                <a:spcPts val="0"/>
-              </a:spcAft>
-              <a:buSzPts val="2800"/>
-              <a:buNone/>
-              <a:defRPr/>
-            </a:lvl5pPr>
-            <a:lvl6pPr lvl="5">
-              <a:spcBef>
-                <a:spcPts val="0"/>
-              </a:spcBef>
-              <a:spcAft>
-                <a:spcPts val="0"/>
-              </a:spcAft>
-              <a:buSzPts val="2800"/>
-              <a:buNone/>
-              <a:defRPr/>
-            </a:lvl6pPr>
-            <a:lvl7pPr lvl="6">
-              <a:spcBef>
-                <a:spcPts val="0"/>
-              </a:spcBef>
-              <a:spcAft>
-                <a:spcPts val="0"/>
-              </a:spcAft>
-              <a:buSzPts val="2800"/>
-              <a:buNone/>
-              <a:defRPr/>
-            </a:lvl7pPr>
-            <a:lvl8pPr lvl="7">
-              <a:spcBef>
-                <a:spcPts val="0"/>
-              </a:spcBef>
-              <a:spcAft>
-                <a:spcPts val="0"/>
-              </a:spcAft>
-              <a:buSzPts val="2800"/>
-              <a:buNone/>
-              <a:defRPr/>
-            </a:lvl8pPr>
-            <a:lvl9pPr lvl="8">
-              <a:spcBef>
-                <a:spcPts val="0"/>
-              </a:spcBef>
-              <a:spcAft>
-                <a:spcPts val="0"/>
-              </a:spcAft>
-              <a:buSzPts val="2800"/>
-              <a:buNone/>
-              <a:defRPr/>
-            </a:lvl9pPr>
-          </a:lstStyle>
-          <a:p>
-            <a:endParaRPr/>
-          </a:p>
-        </p:txBody>
-      </p:sp>
-      <p:sp>
-        <p:nvSpPr>
-          <p:cNvPr id="18" name="Google Shape;18;p4"/>
-          <p:cNvSpPr txBox="1">
-            <a:spLocks noGrp="1"/>
-          </p:cNvSpPr>
-          <p:nvPr>
-            <p:ph type="body" idx="1"/>
-          </p:nvPr>
-        </p:nvSpPr>
-        <p:spPr>
-          <a:xfrm>
-            <a:off x="311700" y="1152475"/>
-            <a:ext cx="8520600" cy="3416400"/>
-          </a:xfrm>
-          <a:prstGeom prst="rect">
-            <a:avLst/>
-          </a:prstGeom>
-        </p:spPr>
-        <p:txBody>
-          <a:bodyPr spcFirstLastPara="1" wrap="square" lIns="91425" tIns="91425" rIns="91425" bIns="91425" anchor="t" anchorCtr="0">
-            <a:noAutofit/>
-          </a:bodyPr>
-          <a:lstStyle>
-            <a:lvl1pPr marL="457200" lvl="0" indent="-342900">
-              <a:spcBef>
-                <a:spcPts val="0"/>
-              </a:spcBef>
-              <a:spcAft>
-                <a:spcPts val="0"/>
-              </a:spcAft>
-              <a:buSzPts val="1800"/>
-              <a:buChar char="●"/>
-              <a:defRPr/>
-            </a:lvl1pPr>
-            <a:lvl2pPr marL="914400" lvl="1" indent="-317500">
-              <a:spcBef>
-                <a:spcPts val="1600"/>
-              </a:spcBef>
-              <a:spcAft>
-                <a:spcPts val="0"/>
-              </a:spcAft>
-              <a:buSzPts val="1400"/>
-              <a:buChar char="○"/>
-              <a:defRPr/>
-            </a:lvl2pPr>
-            <a:lvl3pPr marL="1371600" lvl="2" indent="-317500">
-              <a:spcBef>
-                <a:spcPts val="1600"/>
-              </a:spcBef>
-              <a:spcAft>
-                <a:spcPts val="0"/>
-              </a:spcAft>
-              <a:buSzPts val="1400"/>
-              <a:buChar char="■"/>
-              <a:defRPr/>
-            </a:lvl3pPr>
-            <a:lvl4pPr marL="1828800" lvl="3" indent="-317500">
-              <a:spcBef>
-                <a:spcPts val="1600"/>
-              </a:spcBef>
-              <a:spcAft>
-                <a:spcPts val="0"/>
-              </a:spcAft>
-              <a:buSzPts val="1400"/>
-              <a:buChar char="●"/>
-              <a:defRPr/>
-            </a:lvl4pPr>
-            <a:lvl5pPr marL="2286000" lvl="4" indent="-317500">
-              <a:spcBef>
-                <a:spcPts val="1600"/>
-              </a:spcBef>
-              <a:spcAft>
-                <a:spcPts val="0"/>
-              </a:spcAft>
-              <a:buSzPts val="1400"/>
-              <a:buChar char="○"/>
-              <a:defRPr/>
-            </a:lvl5pPr>
-            <a:lvl6pPr marL="2743200" lvl="5" indent="-317500">
-              <a:spcBef>
-                <a:spcPts val="1600"/>
-              </a:spcBef>
-              <a:spcAft>
-                <a:spcPts val="0"/>
-              </a:spcAft>
-              <a:buSzPts val="1400"/>
-              <a:buChar char="■"/>
-              <a:defRPr/>
-            </a:lvl6pPr>
-            <a:lvl7pPr marL="3200400" lvl="6" indent="-317500">
-              <a:spcBef>
-                <a:spcPts val="1600"/>
-              </a:spcBef>
-              <a:spcAft>
-                <a:spcPts val="0"/>
-              </a:spcAft>
-              <a:buSzPts val="1400"/>
-              <a:buChar char="●"/>
-              <a:defRPr/>
-            </a:lvl7pPr>
-            <a:lvl8pPr marL="3657600" lvl="7" indent="-317500">
-              <a:spcBef>
-                <a:spcPts val="1600"/>
-              </a:spcBef>
-              <a:spcAft>
-                <a:spcPts val="0"/>
-              </a:spcAft>
-              <a:buSzPts val="1400"/>
-              <a:buChar char="○"/>
-              <a:defRPr/>
-            </a:lvl8pPr>
-            <a:lvl9pPr marL="4114800" lvl="8" indent="-317500">
-              <a:spcBef>
-                <a:spcPts val="1600"/>
-              </a:spcBef>
-              <a:spcAft>
-                <a:spcPts val="1600"/>
-              </a:spcAft>
-              <a:buSzPts val="1400"/>
-              <a:buChar char="■"/>
-              <a:defRPr/>
-            </a:lvl9pPr>
-          </a:lstStyle>
-          <a:p>
-            <a:endParaRPr/>
-          </a:p>
-        </p:txBody>
-      </p:sp>
-      <p:sp>
-        <p:nvSpPr>
-          <p:cNvPr id="19" name="Google Shape;19;p4"/>
-          <p:cNvSpPr txBox="1">
-            <a:spLocks noGrp="1"/>
-          </p:cNvSpPr>
-          <p:nvPr>
-            <p:ph type="sldNum" idx="12"/>
-          </p:nvPr>
-        </p:nvSpPr>
-        <p:spPr>
-          <a:xfrm>
-            <a:off x="8472458" y="4663217"/>
-            <a:ext cx="548700" cy="393600"/>
-          </a:xfrm>
-          <a:prstGeom prst="rect">
-            <a:avLst/>
-          </a:prstGeom>
-        </p:spPr>
-        <p:txBody>
-          <a:bodyPr spcFirstLastPara="1" wrap="square" lIns="91425" tIns="91425" rIns="91425" bIns="91425" anchor="ctr" anchorCtr="0">
-            <a:noAutofit/>
-          </a:bodyPr>
-          <a:lstStyle>
-            <a:lvl1pPr lvl="0">
-              <a:buNone/>
-              <a:defRPr/>
-            </a:lvl1pPr>
-            <a:lvl2pPr lvl="1">
-              <a:buNone/>
-              <a:defRPr/>
-            </a:lvl2pPr>
-            <a:lvl3pPr lvl="2">
-              <a:buNone/>
-              <a:defRPr/>
-            </a:lvl3pPr>
-            <a:lvl4pPr lvl="3">
-              <a:buNone/>
-              <a:defRPr/>
-            </a:lvl4pPr>
-            <a:lvl5pPr lvl="4">
-              <a:buNone/>
-              <a:defRPr/>
-            </a:lvl5pPr>
-            <a:lvl6pPr lvl="5">
-              <a:buNone/>
-              <a:defRPr/>
-            </a:lvl6pPr>
-            <a:lvl7pPr lvl="6">
-              <a:buNone/>
-              <a:defRPr/>
-            </a:lvl7pPr>
-            <a:lvl8pPr lvl="7">
-              <a:buNone/>
-              <a:defRPr/>
-            </a:lvl8pPr>
-            <a:lvl9pPr lvl="8">
-              <a:buNone/>
-              <a:defRPr/>
-            </a:lvl9pPr>
-          </a:lstStyle>
-          <a:p>
-            <a:pPr marL="0" lvl="0" indent="0" algn="r" rtl="0">
-              <a:spcBef>
-                <a:spcPts val="0"/>
-              </a:spcBef>
-              <a:spcAft>
-                <a:spcPts val="0"/>
-              </a:spcAft>
-              <a:buNone/>
-            </a:pPr>
-            <a:fld id="{00000000-1234-1234-1234-123412341234}" type="slidenum">
-              <a:rPr lang="fr"/>
-              <a:t>‹N°›</a:t>
-            </a:fld>
-            <a:endParaRPr/>
-          </a:p>
-        </p:txBody>
-      </p:sp>
-    </p:spTree>
-  </p:cSld>
-  <p:clrMapOvr>
-    <a:masterClrMapping/>
-  </p:clrMapOvr>
-</p:sldLayout>
-</file>
-
-<file path=ppt/slideLayouts/slideLayout4.xml><?xml version="1.0" encoding="utf-8"?>
 <p:sldLayout xmlns:a="http://schemas.openxmlformats.org/drawingml/2006/main" xmlns:r="http://schemas.openxmlformats.org/officeDocument/2006/relationships" xmlns:p="http://schemas.openxmlformats.org/presentationml/2006/main" matchingName="Title and two columns" type="twoColTx">
   <p:cSld name="TITLE_AND_TWO_COLUMNS">
     <p:spTree>
@@ -2960,7 +2011,7 @@
 </p:sldLayout>
 </file>
 
-<file path=ppt/slideLayouts/slideLayout5.xml><?xml version="1.0" encoding="utf-8"?>
+<file path=ppt/slideLayouts/slideLayout4.xml><?xml version="1.0" encoding="utf-8"?>
 <p:sldLayout xmlns:a="http://schemas.openxmlformats.org/drawingml/2006/main" xmlns:r="http://schemas.openxmlformats.org/officeDocument/2006/relationships" xmlns:p="http://schemas.openxmlformats.org/presentationml/2006/main" matchingName="Title only" type="titleOnly">
   <p:cSld name="TITLE_ONLY">
     <p:spTree>
@@ -3193,7 +2244,7 @@
 </p:sldLayout>
 </file>
 
-<file path=ppt/slideLayouts/slideLayout6.xml><?xml version="1.0" encoding="utf-8"?>
+<file path=ppt/slideLayouts/slideLayout5.xml><?xml version="1.0" encoding="utf-8"?>
 <p:sldLayout xmlns:a="http://schemas.openxmlformats.org/drawingml/2006/main" xmlns:r="http://schemas.openxmlformats.org/officeDocument/2006/relationships" xmlns:p="http://schemas.openxmlformats.org/presentationml/2006/main" matchingName="One column text">
   <p:cSld name="ONE_COLUMN_TEXT">
     <p:spTree>
@@ -3555,7 +2606,7 @@
 </p:sldLayout>
 </file>
 
-<file path=ppt/slideLayouts/slideLayout7.xml><?xml version="1.0" encoding="utf-8"?>
+<file path=ppt/slideLayouts/slideLayout6.xml><?xml version="1.0" encoding="utf-8"?>
 <p:sldLayout xmlns:a="http://schemas.openxmlformats.org/drawingml/2006/main" xmlns:r="http://schemas.openxmlformats.org/officeDocument/2006/relationships" xmlns:p="http://schemas.openxmlformats.org/presentationml/2006/main" matchingName="Main point">
   <p:cSld name="MAIN_POINT">
     <p:spTree>
@@ -3788,7 +2839,7 @@
 </p:sldLayout>
 </file>
 
-<file path=ppt/slideLayouts/slideLayout8.xml><?xml version="1.0" encoding="utf-8"?>
+<file path=ppt/slideLayouts/slideLayout7.xml><?xml version="1.0" encoding="utf-8"?>
 <p:sldLayout xmlns:a="http://schemas.openxmlformats.org/drawingml/2006/main" xmlns:r="http://schemas.openxmlformats.org/officeDocument/2006/relationships" xmlns:p="http://schemas.openxmlformats.org/presentationml/2006/main" matchingName="Section title and description">
   <p:cSld name="SECTION_TITLE_AND_DESCRIPTION">
     <p:spTree>
@@ -4346,7 +3397,7 @@
 </p:sldLayout>
 </file>
 
-<file path=ppt/slideLayouts/slideLayout9.xml><?xml version="1.0" encoding="utf-8"?>
+<file path=ppt/slideLayouts/slideLayout8.xml><?xml version="1.0" encoding="utf-8"?>
 <p:sldLayout xmlns:a="http://schemas.openxmlformats.org/drawingml/2006/main" xmlns:r="http://schemas.openxmlformats.org/officeDocument/2006/relationships" xmlns:p="http://schemas.openxmlformats.org/presentationml/2006/main" matchingName="Caption">
   <p:cSld name="CAPTION_ONLY">
     <p:spTree>
@@ -4410,6 +3461,370 @@
       <p:sp>
         <p:nvSpPr>
           <p:cNvPr id="43" name="Google Shape;43;p10"/>
+          <p:cNvSpPr txBox="1">
+            <a:spLocks noGrp="1"/>
+          </p:cNvSpPr>
+          <p:nvPr>
+            <p:ph type="sldNum" idx="12"/>
+          </p:nvPr>
+        </p:nvSpPr>
+        <p:spPr>
+          <a:xfrm>
+            <a:off x="8472458" y="4663217"/>
+            <a:ext cx="548700" cy="393600"/>
+          </a:xfrm>
+          <a:prstGeom prst="rect">
+            <a:avLst/>
+          </a:prstGeom>
+        </p:spPr>
+        <p:txBody>
+          <a:bodyPr spcFirstLastPara="1" wrap="square" lIns="91425" tIns="91425" rIns="91425" bIns="91425" anchor="ctr" anchorCtr="0">
+            <a:noAutofit/>
+          </a:bodyPr>
+          <a:lstStyle>
+            <a:lvl1pPr lvl="0">
+              <a:buNone/>
+              <a:defRPr/>
+            </a:lvl1pPr>
+            <a:lvl2pPr lvl="1">
+              <a:buNone/>
+              <a:defRPr/>
+            </a:lvl2pPr>
+            <a:lvl3pPr lvl="2">
+              <a:buNone/>
+              <a:defRPr/>
+            </a:lvl3pPr>
+            <a:lvl4pPr lvl="3">
+              <a:buNone/>
+              <a:defRPr/>
+            </a:lvl4pPr>
+            <a:lvl5pPr lvl="4">
+              <a:buNone/>
+              <a:defRPr/>
+            </a:lvl5pPr>
+            <a:lvl6pPr lvl="5">
+              <a:buNone/>
+              <a:defRPr/>
+            </a:lvl6pPr>
+            <a:lvl7pPr lvl="6">
+              <a:buNone/>
+              <a:defRPr/>
+            </a:lvl7pPr>
+            <a:lvl8pPr lvl="7">
+              <a:buNone/>
+              <a:defRPr/>
+            </a:lvl8pPr>
+            <a:lvl9pPr lvl="8">
+              <a:buNone/>
+              <a:defRPr/>
+            </a:lvl9pPr>
+          </a:lstStyle>
+          <a:p>
+            <a:pPr marL="0" lvl="0" indent="0" algn="r" rtl="0">
+              <a:spcBef>
+                <a:spcPts val="0"/>
+              </a:spcBef>
+              <a:spcAft>
+                <a:spcPts val="0"/>
+              </a:spcAft>
+              <a:buNone/>
+            </a:pPr>
+            <a:fld id="{00000000-1234-1234-1234-123412341234}" type="slidenum">
+              <a:rPr lang="fr"/>
+              <a:t>‹N°›</a:t>
+            </a:fld>
+            <a:endParaRPr/>
+          </a:p>
+        </p:txBody>
+      </p:sp>
+    </p:spTree>
+  </p:cSld>
+  <p:clrMapOvr>
+    <a:masterClrMapping/>
+  </p:clrMapOvr>
+</p:sldLayout>
+</file>
+
+<file path=ppt/slideLayouts/slideLayout9.xml><?xml version="1.0" encoding="utf-8"?>
+<p:sldLayout xmlns:a="http://schemas.openxmlformats.org/drawingml/2006/main" xmlns:r="http://schemas.openxmlformats.org/officeDocument/2006/relationships" xmlns:p="http://schemas.openxmlformats.org/presentationml/2006/main" matchingName="Big number">
+  <p:cSld name="BIG_NUMBER">
+    <p:spTree>
+      <p:nvGrpSpPr>
+        <p:cNvPr id="1" name="Shape 44"/>
+        <p:cNvGrpSpPr/>
+        <p:nvPr/>
+      </p:nvGrpSpPr>
+      <p:grpSpPr>
+        <a:xfrm>
+          <a:off x="0" y="0"/>
+          <a:ext cx="0" cy="0"/>
+          <a:chOff x="0" y="0"/>
+          <a:chExt cx="0" cy="0"/>
+        </a:xfrm>
+      </p:grpSpPr>
+      <p:sp>
+        <p:nvSpPr>
+          <p:cNvPr id="45" name="Google Shape;45;p11"/>
+          <p:cNvSpPr txBox="1">
+            <a:spLocks noGrp="1"/>
+          </p:cNvSpPr>
+          <p:nvPr>
+            <p:ph type="title" hasCustomPrompt="1"/>
+          </p:nvPr>
+        </p:nvSpPr>
+        <p:spPr>
+          <a:xfrm>
+            <a:off x="311700" y="1106125"/>
+            <a:ext cx="8520600" cy="1963500"/>
+          </a:xfrm>
+          <a:prstGeom prst="rect">
+            <a:avLst/>
+          </a:prstGeom>
+        </p:spPr>
+        <p:txBody>
+          <a:bodyPr spcFirstLastPara="1" wrap="square" lIns="91425" tIns="91425" rIns="91425" bIns="91425" anchor="b" anchorCtr="0">
+            <a:noAutofit/>
+          </a:bodyPr>
+          <a:lstStyle>
+            <a:lvl1pPr lvl="0" algn="ctr">
+              <a:spcBef>
+                <a:spcPts val="0"/>
+              </a:spcBef>
+              <a:spcAft>
+                <a:spcPts val="0"/>
+              </a:spcAft>
+              <a:buSzPts val="12000"/>
+              <a:buNone/>
+              <a:defRPr sz="12000"/>
+            </a:lvl1pPr>
+            <a:lvl2pPr lvl="1" algn="ctr">
+              <a:spcBef>
+                <a:spcPts val="0"/>
+              </a:spcBef>
+              <a:spcAft>
+                <a:spcPts val="0"/>
+              </a:spcAft>
+              <a:buSzPts val="12000"/>
+              <a:buNone/>
+              <a:defRPr sz="12000"/>
+            </a:lvl2pPr>
+            <a:lvl3pPr lvl="2" algn="ctr">
+              <a:spcBef>
+                <a:spcPts val="0"/>
+              </a:spcBef>
+              <a:spcAft>
+                <a:spcPts val="0"/>
+              </a:spcAft>
+              <a:buSzPts val="12000"/>
+              <a:buNone/>
+              <a:defRPr sz="12000"/>
+            </a:lvl3pPr>
+            <a:lvl4pPr lvl="3" algn="ctr">
+              <a:spcBef>
+                <a:spcPts val="0"/>
+              </a:spcBef>
+              <a:spcAft>
+                <a:spcPts val="0"/>
+              </a:spcAft>
+              <a:buSzPts val="12000"/>
+              <a:buNone/>
+              <a:defRPr sz="12000"/>
+            </a:lvl4pPr>
+            <a:lvl5pPr lvl="4" algn="ctr">
+              <a:spcBef>
+                <a:spcPts val="0"/>
+              </a:spcBef>
+              <a:spcAft>
+                <a:spcPts val="0"/>
+              </a:spcAft>
+              <a:buSzPts val="12000"/>
+              <a:buNone/>
+              <a:defRPr sz="12000"/>
+            </a:lvl5pPr>
+            <a:lvl6pPr lvl="5" algn="ctr">
+              <a:spcBef>
+                <a:spcPts val="0"/>
+              </a:spcBef>
+              <a:spcAft>
+                <a:spcPts val="0"/>
+              </a:spcAft>
+              <a:buSzPts val="12000"/>
+              <a:buNone/>
+              <a:defRPr sz="12000"/>
+            </a:lvl6pPr>
+            <a:lvl7pPr lvl="6" algn="ctr">
+              <a:spcBef>
+                <a:spcPts val="0"/>
+              </a:spcBef>
+              <a:spcAft>
+                <a:spcPts val="0"/>
+              </a:spcAft>
+              <a:buSzPts val="12000"/>
+              <a:buNone/>
+              <a:defRPr sz="12000"/>
+            </a:lvl7pPr>
+            <a:lvl8pPr lvl="7" algn="ctr">
+              <a:spcBef>
+                <a:spcPts val="0"/>
+              </a:spcBef>
+              <a:spcAft>
+                <a:spcPts val="0"/>
+              </a:spcAft>
+              <a:buSzPts val="12000"/>
+              <a:buNone/>
+              <a:defRPr sz="12000"/>
+            </a:lvl8pPr>
+            <a:lvl9pPr lvl="8" algn="ctr">
+              <a:spcBef>
+                <a:spcPts val="0"/>
+              </a:spcBef>
+              <a:spcAft>
+                <a:spcPts val="0"/>
+              </a:spcAft>
+              <a:buSzPts val="12000"/>
+              <a:buNone/>
+              <a:defRPr sz="12000"/>
+            </a:lvl9pPr>
+          </a:lstStyle>
+          <a:p>
+            <a:r>
+              <a:t>xx%</a:t>
+            </a:r>
+          </a:p>
+        </p:txBody>
+      </p:sp>
+      <p:sp>
+        <p:nvSpPr>
+          <p:cNvPr id="46" name="Google Shape;46;p11"/>
+          <p:cNvSpPr txBox="1">
+            <a:spLocks noGrp="1"/>
+          </p:cNvSpPr>
+          <p:nvPr>
+            <p:ph type="body" idx="1"/>
+          </p:nvPr>
+        </p:nvSpPr>
+        <p:spPr>
+          <a:xfrm>
+            <a:off x="311700" y="3152225"/>
+            <a:ext cx="8520600" cy="1300800"/>
+          </a:xfrm>
+          <a:prstGeom prst="rect">
+            <a:avLst/>
+          </a:prstGeom>
+        </p:spPr>
+        <p:txBody>
+          <a:bodyPr spcFirstLastPara="1" wrap="square" lIns="91425" tIns="91425" rIns="91425" bIns="91425" anchor="t" anchorCtr="0">
+            <a:noAutofit/>
+          </a:bodyPr>
+          <a:lstStyle>
+            <a:lvl1pPr marL="457200" lvl="0" indent="-342900" algn="ctr">
+              <a:spcBef>
+                <a:spcPts val="0"/>
+              </a:spcBef>
+              <a:spcAft>
+                <a:spcPts val="0"/>
+              </a:spcAft>
+              <a:buSzPts val="1800"/>
+              <a:buChar char="●"/>
+              <a:defRPr/>
+            </a:lvl1pPr>
+            <a:lvl2pPr marL="914400" lvl="1" indent="-317500" algn="ctr">
+              <a:spcBef>
+                <a:spcPts val="1600"/>
+              </a:spcBef>
+              <a:spcAft>
+                <a:spcPts val="0"/>
+              </a:spcAft>
+              <a:buSzPts val="1400"/>
+              <a:buChar char="○"/>
+              <a:defRPr/>
+            </a:lvl2pPr>
+            <a:lvl3pPr marL="1371600" lvl="2" indent="-317500" algn="ctr">
+              <a:spcBef>
+                <a:spcPts val="1600"/>
+              </a:spcBef>
+              <a:spcAft>
+                <a:spcPts val="0"/>
+              </a:spcAft>
+              <a:buSzPts val="1400"/>
+              <a:buChar char="■"/>
+              <a:defRPr/>
+            </a:lvl3pPr>
+            <a:lvl4pPr marL="1828800" lvl="3" indent="-317500" algn="ctr">
+              <a:spcBef>
+                <a:spcPts val="1600"/>
+              </a:spcBef>
+              <a:spcAft>
+                <a:spcPts val="0"/>
+              </a:spcAft>
+              <a:buSzPts val="1400"/>
+              <a:buChar char="●"/>
+              <a:defRPr/>
+            </a:lvl4pPr>
+            <a:lvl5pPr marL="2286000" lvl="4" indent="-317500" algn="ctr">
+              <a:spcBef>
+                <a:spcPts val="1600"/>
+              </a:spcBef>
+              <a:spcAft>
+                <a:spcPts val="0"/>
+              </a:spcAft>
+              <a:buSzPts val="1400"/>
+              <a:buChar char="○"/>
+              <a:defRPr/>
+            </a:lvl5pPr>
+            <a:lvl6pPr marL="2743200" lvl="5" indent="-317500" algn="ctr">
+              <a:spcBef>
+                <a:spcPts val="1600"/>
+              </a:spcBef>
+              <a:spcAft>
+                <a:spcPts val="0"/>
+              </a:spcAft>
+              <a:buSzPts val="1400"/>
+              <a:buChar char="■"/>
+              <a:defRPr/>
+            </a:lvl6pPr>
+            <a:lvl7pPr marL="3200400" lvl="6" indent="-317500" algn="ctr">
+              <a:spcBef>
+                <a:spcPts val="1600"/>
+              </a:spcBef>
+              <a:spcAft>
+                <a:spcPts val="0"/>
+              </a:spcAft>
+              <a:buSzPts val="1400"/>
+              <a:buChar char="●"/>
+              <a:defRPr/>
+            </a:lvl7pPr>
+            <a:lvl8pPr marL="3657600" lvl="7" indent="-317500" algn="ctr">
+              <a:spcBef>
+                <a:spcPts val="1600"/>
+              </a:spcBef>
+              <a:spcAft>
+                <a:spcPts val="0"/>
+              </a:spcAft>
+              <a:buSzPts val="1400"/>
+              <a:buChar char="○"/>
+              <a:defRPr/>
+            </a:lvl8pPr>
+            <a:lvl9pPr marL="4114800" lvl="8" indent="-317500" algn="ctr">
+              <a:spcBef>
+                <a:spcPts val="1600"/>
+              </a:spcBef>
+              <a:spcAft>
+                <a:spcPts val="1600"/>
+              </a:spcAft>
+              <a:buSzPts val="1400"/>
+              <a:buChar char="■"/>
+              <a:defRPr/>
+            </a:lvl9pPr>
+          </a:lstStyle>
+          <a:p>
+            <a:endParaRPr/>
+          </a:p>
+        </p:txBody>
+      </p:sp>
+      <p:sp>
+        <p:nvSpPr>
+          <p:cNvPr id="47" name="Google Shape;47;p11"/>
           <p:cNvSpPr txBox="1">
             <a:spLocks noGrp="1"/>
           </p:cNvSpPr>
@@ -5063,15 +4478,14 @@
   <p:sldLayoutIdLst>
     <p:sldLayoutId id="2147483648" r:id="rId1"/>
     <p:sldLayoutId id="2147483649" r:id="rId2"/>
-    <p:sldLayoutId id="2147483650" r:id="rId3"/>
-    <p:sldLayoutId id="2147483651" r:id="rId4"/>
-    <p:sldLayoutId id="2147483652" r:id="rId5"/>
-    <p:sldLayoutId id="2147483653" r:id="rId6"/>
-    <p:sldLayoutId id="2147483654" r:id="rId7"/>
-    <p:sldLayoutId id="2147483655" r:id="rId8"/>
-    <p:sldLayoutId id="2147483656" r:id="rId9"/>
-    <p:sldLayoutId id="2147483657" r:id="rId10"/>
-    <p:sldLayoutId id="2147483658" r:id="rId11"/>
+    <p:sldLayoutId id="2147483651" r:id="rId3"/>
+    <p:sldLayoutId id="2147483652" r:id="rId4"/>
+    <p:sldLayoutId id="2147483653" r:id="rId5"/>
+    <p:sldLayoutId id="2147483654" r:id="rId6"/>
+    <p:sldLayoutId id="2147483655" r:id="rId7"/>
+    <p:sldLayoutId id="2147483656" r:id="rId8"/>
+    <p:sldLayoutId id="2147483657" r:id="rId9"/>
+    <p:sldLayoutId id="2147483658" r:id="rId10"/>
   </p:sldLayoutIdLst>
   <p:hf sldNum="0" hdr="0" ftr="0" dt="0"/>
   <p:txStyles>
@@ -5771,427 +5185,6 @@
   <p:cSld>
     <p:spTree>
       <p:nvGrpSpPr>
-        <p:cNvPr id="1" name="Shape 53"/>
-        <p:cNvGrpSpPr/>
-        <p:nvPr/>
-      </p:nvGrpSpPr>
-      <p:grpSpPr>
-        <a:xfrm>
-          <a:off x="0" y="0"/>
-          <a:ext cx="0" cy="0"/>
-          <a:chOff x="0" y="0"/>
-          <a:chExt cx="0" cy="0"/>
-        </a:xfrm>
-      </p:grpSpPr>
-      <p:sp>
-        <p:nvSpPr>
-          <p:cNvPr id="54" name="Google Shape;54;p13"/>
-          <p:cNvSpPr/>
-          <p:nvPr/>
-        </p:nvSpPr>
-        <p:spPr>
-          <a:xfrm>
-            <a:off x="304800" y="436250"/>
-            <a:ext cx="8439300" cy="4000500"/>
-          </a:xfrm>
-          <a:prstGeom prst="roundRect">
-            <a:avLst>
-              <a:gd name="adj" fmla="val 16667"/>
-            </a:avLst>
-          </a:prstGeom>
-          <a:noFill/>
-          <a:ln w="38100" cap="flat" cmpd="sng">
-            <a:solidFill>
-              <a:srgbClr val="4A86E8"/>
-            </a:solidFill>
-            <a:prstDash val="solid"/>
-            <a:round/>
-            <a:headEnd type="none" w="sm" len="sm"/>
-            <a:tailEnd type="none" w="sm" len="sm"/>
-          </a:ln>
-        </p:spPr>
-        <p:txBody>
-          <a:bodyPr spcFirstLastPara="1" wrap="square" lIns="91425" tIns="91425" rIns="91425" bIns="91425" anchor="ctr" anchorCtr="0">
-            <a:noAutofit/>
-          </a:bodyPr>
-          <a:lstStyle/>
-          <a:p>
-            <a:pPr marL="0" lvl="0" indent="0" algn="l" rtl="0">
-              <a:spcBef>
-                <a:spcPts val="0"/>
-              </a:spcBef>
-              <a:spcAft>
-                <a:spcPts val="0"/>
-              </a:spcAft>
-              <a:buNone/>
-            </a:pPr>
-            <a:endParaRPr/>
-          </a:p>
-        </p:txBody>
-      </p:sp>
-      <p:sp>
-        <p:nvSpPr>
-          <p:cNvPr id="55" name="Google Shape;55;p13"/>
-          <p:cNvSpPr txBox="1"/>
-          <p:nvPr/>
-        </p:nvSpPr>
-        <p:spPr>
-          <a:xfrm>
-            <a:off x="304800" y="1988825"/>
-            <a:ext cx="8439300" cy="762000"/>
-          </a:xfrm>
-          <a:prstGeom prst="rect">
-            <a:avLst/>
-          </a:prstGeom>
-          <a:solidFill>
-            <a:srgbClr val="4A86E8"/>
-          </a:solidFill>
-          <a:ln>
-            <a:noFill/>
-          </a:ln>
-        </p:spPr>
-        <p:txBody>
-          <a:bodyPr spcFirstLastPara="1" wrap="square" lIns="91425" tIns="91425" rIns="91425" bIns="91425" anchor="t" anchorCtr="0">
-            <a:noAutofit/>
-          </a:bodyPr>
-          <a:lstStyle/>
-          <a:p>
-            <a:pPr marL="0" lvl="0" indent="0" algn="ctr" rtl="0">
-              <a:spcBef>
-                <a:spcPts val="0"/>
-              </a:spcBef>
-              <a:spcAft>
-                <a:spcPts val="0"/>
-              </a:spcAft>
-              <a:buClr>
-                <a:schemeClr val="dk1"/>
-              </a:buClr>
-              <a:buSzPts val="1100"/>
-              <a:buFont typeface="Arial"/>
-              <a:buNone/>
-            </a:pPr>
-            <a:r>
-              <a:rPr lang="fr" sz="2800">
-                <a:solidFill>
-                  <a:schemeClr val="lt1"/>
-                </a:solidFill>
-                <a:latin typeface="Special Elite"/>
-                <a:ea typeface="Special Elite"/>
-                <a:cs typeface="Special Elite"/>
-                <a:sym typeface="Special Elite"/>
-              </a:rPr>
-              <a:t>Projet XXXX</a:t>
-            </a:r>
-            <a:endParaRPr/>
-          </a:p>
-        </p:txBody>
-      </p:sp>
-      <p:sp>
-        <p:nvSpPr>
-          <p:cNvPr id="56" name="Google Shape;56;p13"/>
-          <p:cNvSpPr txBox="1">
-            <a:spLocks noGrp="1"/>
-          </p:cNvSpPr>
-          <p:nvPr>
-            <p:ph type="title"/>
-          </p:nvPr>
-        </p:nvSpPr>
-        <p:spPr>
-          <a:xfrm>
-            <a:off x="2535450" y="864125"/>
-            <a:ext cx="4251300" cy="572700"/>
-          </a:xfrm>
-          <a:prstGeom prst="rect">
-            <a:avLst/>
-          </a:prstGeom>
-        </p:spPr>
-        <p:txBody>
-          <a:bodyPr spcFirstLastPara="1" wrap="square" lIns="91425" tIns="91425" rIns="91425" bIns="91425" anchor="t" anchorCtr="0">
-            <a:noAutofit/>
-          </a:bodyPr>
-          <a:lstStyle/>
-          <a:p>
-            <a:pPr marL="0" lvl="0" indent="0" algn="l" rtl="0">
-              <a:spcBef>
-                <a:spcPts val="0"/>
-              </a:spcBef>
-              <a:spcAft>
-                <a:spcPts val="0"/>
-              </a:spcAft>
-              <a:buNone/>
-            </a:pPr>
-            <a:r>
-              <a:rPr lang="fr">
-                <a:solidFill>
-                  <a:srgbClr val="4A86E8"/>
-                </a:solidFill>
-                <a:latin typeface="Special Elite"/>
-                <a:ea typeface="Special Elite"/>
-                <a:cs typeface="Special Elite"/>
-                <a:sym typeface="Special Elite"/>
-              </a:rPr>
-              <a:t>Réunion de Chantier</a:t>
-            </a:r>
-            <a:endParaRPr>
-              <a:solidFill>
-                <a:srgbClr val="4A86E8"/>
-              </a:solidFill>
-              <a:latin typeface="Special Elite"/>
-              <a:ea typeface="Special Elite"/>
-              <a:cs typeface="Special Elite"/>
-              <a:sym typeface="Special Elite"/>
-            </a:endParaRPr>
-          </a:p>
-        </p:txBody>
-      </p:sp>
-      <p:sp>
-        <p:nvSpPr>
-          <p:cNvPr id="57" name="Google Shape;57;p13"/>
-          <p:cNvSpPr txBox="1">
-            <a:spLocks noGrp="1"/>
-          </p:cNvSpPr>
-          <p:nvPr>
-            <p:ph type="title"/>
-          </p:nvPr>
-        </p:nvSpPr>
-        <p:spPr>
-          <a:xfrm>
-            <a:off x="3289650" y="3131375"/>
-            <a:ext cx="2702400" cy="572700"/>
-          </a:xfrm>
-          <a:prstGeom prst="rect">
-            <a:avLst/>
-          </a:prstGeom>
-        </p:spPr>
-        <p:txBody>
-          <a:bodyPr spcFirstLastPara="1" wrap="square" lIns="91425" tIns="91425" rIns="91425" bIns="91425" anchor="t" anchorCtr="0">
-            <a:noAutofit/>
-          </a:bodyPr>
-          <a:lstStyle/>
-          <a:p>
-            <a:pPr marL="0" lvl="0" indent="0" algn="l" rtl="0">
-              <a:spcBef>
-                <a:spcPts val="0"/>
-              </a:spcBef>
-              <a:spcAft>
-                <a:spcPts val="0"/>
-              </a:spcAft>
-              <a:buNone/>
-            </a:pPr>
-            <a:r>
-              <a:rPr lang="fr">
-                <a:solidFill>
-                  <a:srgbClr val="4A86E8"/>
-                </a:solidFill>
-                <a:latin typeface="Special Elite"/>
-                <a:ea typeface="Special Elite"/>
-                <a:cs typeface="Special Elite"/>
-                <a:sym typeface="Special Elite"/>
-              </a:rPr>
-              <a:t>xx/xx/2019</a:t>
-            </a:r>
-            <a:endParaRPr/>
-          </a:p>
-        </p:txBody>
-      </p:sp>
-      <p:sp>
-        <p:nvSpPr>
-          <p:cNvPr id="58" name="Google Shape;58;p13"/>
-          <p:cNvSpPr txBox="1"/>
-          <p:nvPr/>
-        </p:nvSpPr>
-        <p:spPr>
-          <a:xfrm>
-            <a:off x="0" y="13325"/>
-            <a:ext cx="5565600" cy="298800"/>
-          </a:xfrm>
-          <a:prstGeom prst="rect">
-            <a:avLst/>
-          </a:prstGeom>
-          <a:noFill/>
-          <a:ln>
-            <a:noFill/>
-          </a:ln>
-        </p:spPr>
-        <p:txBody>
-          <a:bodyPr spcFirstLastPara="1" wrap="square" lIns="91425" tIns="91425" rIns="91425" bIns="91425" anchor="t" anchorCtr="0">
-            <a:noAutofit/>
-          </a:bodyPr>
-          <a:lstStyle/>
-          <a:p>
-            <a:pPr marL="0" lvl="0" indent="0" algn="l" rtl="0">
-              <a:spcBef>
-                <a:spcPts val="0"/>
-              </a:spcBef>
-              <a:spcAft>
-                <a:spcPts val="0"/>
-              </a:spcAft>
-              <a:buNone/>
-            </a:pPr>
-            <a:r>
-              <a:rPr lang="fr" sz="1000"/>
-              <a:t>Vous pouvez travailler télécharger ces diapositives : menu </a:t>
-            </a:r>
-            <a:r>
-              <a:rPr lang="fr" sz="1000">
-                <a:solidFill>
-                  <a:schemeClr val="dk1"/>
-                </a:solidFill>
-              </a:rPr>
-              <a:t>fichier/télécharger/format/powerpoint </a:t>
-            </a:r>
-            <a:endParaRPr sz="1000"/>
-          </a:p>
-        </p:txBody>
-      </p:sp>
-      <p:sp>
-        <p:nvSpPr>
-          <p:cNvPr id="59" name="Google Shape;59;p13"/>
-          <p:cNvSpPr txBox="1"/>
-          <p:nvPr/>
-        </p:nvSpPr>
-        <p:spPr>
-          <a:xfrm>
-            <a:off x="3006825" y="4844700"/>
-            <a:ext cx="6137100" cy="298800"/>
-          </a:xfrm>
-          <a:prstGeom prst="rect">
-            <a:avLst/>
-          </a:prstGeom>
-          <a:noFill/>
-          <a:ln>
-            <a:noFill/>
-          </a:ln>
-        </p:spPr>
-        <p:txBody>
-          <a:bodyPr spcFirstLastPara="1" wrap="square" lIns="91425" tIns="91425" rIns="91425" bIns="91425" anchor="t" anchorCtr="0">
-            <a:noAutofit/>
-          </a:bodyPr>
-          <a:lstStyle/>
-          <a:p>
-            <a:pPr marL="0" lvl="0" indent="0" algn="r" rtl="0">
-              <a:spcBef>
-                <a:spcPts val="0"/>
-              </a:spcBef>
-              <a:spcAft>
-                <a:spcPts val="0"/>
-              </a:spcAft>
-              <a:buNone/>
-            </a:pPr>
-            <a:r>
-              <a:rPr lang="fr" sz="1000" b="1">
-                <a:solidFill>
-                  <a:srgbClr val="FF0000"/>
-                </a:solidFill>
-              </a:rPr>
-              <a:t>N’utilisez pas ce modèle pour le livrable 3 du MOOC : vous devez créer une présentation orginale !</a:t>
-            </a:r>
-            <a:endParaRPr sz="1000" b="1">
-              <a:solidFill>
-                <a:srgbClr val="FF0000"/>
-              </a:solidFill>
-            </a:endParaRPr>
-          </a:p>
-        </p:txBody>
-      </p:sp>
-      <p:sp>
-        <p:nvSpPr>
-          <p:cNvPr id="60" name="Google Shape;60;p13"/>
-          <p:cNvSpPr txBox="1"/>
-          <p:nvPr/>
-        </p:nvSpPr>
-        <p:spPr>
-          <a:xfrm>
-            <a:off x="93075" y="4875350"/>
-            <a:ext cx="2328000" cy="268200"/>
-          </a:xfrm>
-          <a:prstGeom prst="rect">
-            <a:avLst/>
-          </a:prstGeom>
-          <a:noFill/>
-          <a:ln>
-            <a:noFill/>
-          </a:ln>
-        </p:spPr>
-        <p:txBody>
-          <a:bodyPr spcFirstLastPara="1" wrap="square" lIns="91425" tIns="91425" rIns="91425" bIns="91425" anchor="t" anchorCtr="0">
-            <a:noAutofit/>
-          </a:bodyPr>
-          <a:lstStyle/>
-          <a:p>
-            <a:pPr marL="0" lvl="0" indent="0" algn="l" rtl="0">
-              <a:spcBef>
-                <a:spcPts val="0"/>
-              </a:spcBef>
-              <a:spcAft>
-                <a:spcPts val="0"/>
-              </a:spcAft>
-              <a:buNone/>
-            </a:pPr>
-            <a:r>
-              <a:rPr lang="fr" sz="800"/>
-              <a:t>URL de ce modèle : </a:t>
-            </a:r>
-            <a:r>
-              <a:rPr lang="fr" sz="800" u="sng">
-                <a:solidFill>
-                  <a:schemeClr val="hlink"/>
-                </a:solidFill>
-                <a:hlinkClick r:id="rId3"/>
-              </a:rPr>
-              <a:t>http://bit.ly/2zCqItB</a:t>
-            </a:r>
-            <a:r>
-              <a:rPr lang="fr" sz="800"/>
-              <a:t> </a:t>
-            </a:r>
-            <a:endParaRPr sz="800"/>
-          </a:p>
-        </p:txBody>
-      </p:sp>
-      <p:pic>
-        <p:nvPicPr>
-          <p:cNvPr id="61" name="Google Shape;61;p13">
-            <a:hlinkClick r:id="rId4"/>
-          </p:cNvPr>
-          <p:cNvPicPr preferRelativeResize="0"/>
-          <p:nvPr/>
-        </p:nvPicPr>
-        <p:blipFill>
-          <a:blip r:embed="rId5">
-            <a:alphaModFix/>
-          </a:blip>
-          <a:stretch>
-            <a:fillRect/>
-          </a:stretch>
-        </p:blipFill>
-        <p:spPr>
-          <a:xfrm>
-            <a:off x="615944" y="665100"/>
-            <a:ext cx="1443375" cy="1115975"/>
-          </a:xfrm>
-          <a:prstGeom prst="rect">
-            <a:avLst/>
-          </a:prstGeom>
-          <a:noFill/>
-          <a:ln>
-            <a:noFill/>
-          </a:ln>
-        </p:spPr>
-      </p:pic>
-    </p:spTree>
-  </p:cSld>
-  <p:clrMapOvr>
-    <a:masterClrMapping/>
-  </p:clrMapOvr>
-</p:sld>
-</file>
-
-<file path=ppt/slides/slide2.xml><?xml version="1.0" encoding="utf-8"?>
-<p:sld xmlns:a="http://schemas.openxmlformats.org/drawingml/2006/main" xmlns:r="http://schemas.openxmlformats.org/officeDocument/2006/relationships" xmlns:p="http://schemas.openxmlformats.org/presentationml/2006/main">
-  <p:cSld>
-    <p:spTree>
-      <p:nvGrpSpPr>
         <p:cNvPr id="1" name="Shape 65"/>
         <p:cNvGrpSpPr/>
         <p:nvPr/>
@@ -7835,1927 +6828,6 @@
           </a:p>
         </p:txBody>
       </p:sp>
-    </p:spTree>
-  </p:cSld>
-  <p:clrMapOvr>
-    <a:masterClrMapping/>
-  </p:clrMapOvr>
-</p:sld>
-</file>
-
-<file path=ppt/slides/slide3.xml><?xml version="1.0" encoding="utf-8"?>
-<p:sld xmlns:a="http://schemas.openxmlformats.org/drawingml/2006/main" xmlns:r="http://schemas.openxmlformats.org/officeDocument/2006/relationships" xmlns:p="http://schemas.openxmlformats.org/presentationml/2006/main">
-  <p:cSld>
-    <p:spTree>
-      <p:nvGrpSpPr>
-        <p:cNvPr id="1" name="Shape 121"/>
-        <p:cNvGrpSpPr/>
-        <p:nvPr/>
-      </p:nvGrpSpPr>
-      <p:grpSpPr>
-        <a:xfrm>
-          <a:off x="0" y="0"/>
-          <a:ext cx="0" cy="0"/>
-          <a:chOff x="0" y="0"/>
-          <a:chExt cx="0" cy="0"/>
-        </a:xfrm>
-      </p:grpSpPr>
-      <p:graphicFrame>
-        <p:nvGraphicFramePr>
-          <p:cNvPr id="123" name="Google Shape;123;p15"/>
-          <p:cNvGraphicFramePr/>
-          <p:nvPr>
-            <p:extLst>
-              <p:ext uri="{D42A27DB-BD31-4B8C-83A1-F6EECF244321}">
-                <p14:modId xmlns:p14="http://schemas.microsoft.com/office/powerpoint/2010/main" val="875576872"/>
-              </p:ext>
-            </p:extLst>
-          </p:nvPr>
-        </p:nvGraphicFramePr>
-        <p:xfrm>
-          <a:off x="213322" y="252098"/>
-          <a:ext cx="8717356" cy="4523412"/>
-        </p:xfrm>
-        <a:graphic>
-          <a:graphicData uri="http://schemas.openxmlformats.org/drawingml/2006/table">
-            <a:tbl>
-              <a:tblPr>
-                <a:noFill/>
-                <a:tableStyleId>{E6B82D98-7413-491F-861D-626753F8F8BA}</a:tableStyleId>
-              </a:tblPr>
-              <a:tblGrid>
-                <a:gridCol w="3944026">
-                  <a:extLst>
-                    <a:ext uri="{9D8B030D-6E8A-4147-A177-3AD203B41FA5}">
-                      <a16:colId xmlns:a16="http://schemas.microsoft.com/office/drawing/2014/main" val="20000"/>
-                    </a:ext>
-                  </a:extLst>
-                </a:gridCol>
-                <a:gridCol w="769175">
-                  <a:extLst>
-                    <a:ext uri="{9D8B030D-6E8A-4147-A177-3AD203B41FA5}">
-                      <a16:colId xmlns:a16="http://schemas.microsoft.com/office/drawing/2014/main" val="20001"/>
-                    </a:ext>
-                  </a:extLst>
-                </a:gridCol>
-                <a:gridCol w="769145">
-                  <a:extLst>
-                    <a:ext uri="{9D8B030D-6E8A-4147-A177-3AD203B41FA5}">
-                      <a16:colId xmlns:a16="http://schemas.microsoft.com/office/drawing/2014/main" val="20002"/>
-                    </a:ext>
-                  </a:extLst>
-                </a:gridCol>
-                <a:gridCol w="792284">
-                  <a:extLst>
-                    <a:ext uri="{9D8B030D-6E8A-4147-A177-3AD203B41FA5}">
-                      <a16:colId xmlns:a16="http://schemas.microsoft.com/office/drawing/2014/main" val="20003"/>
-                    </a:ext>
-                  </a:extLst>
-                </a:gridCol>
-                <a:gridCol w="942820">
-                  <a:extLst>
-                    <a:ext uri="{9D8B030D-6E8A-4147-A177-3AD203B41FA5}">
-                      <a16:colId xmlns:a16="http://schemas.microsoft.com/office/drawing/2014/main" val="20004"/>
-                    </a:ext>
-                  </a:extLst>
-                </a:gridCol>
-                <a:gridCol w="1499906">
-                  <a:extLst>
-                    <a:ext uri="{9D8B030D-6E8A-4147-A177-3AD203B41FA5}">
-                      <a16:colId xmlns:a16="http://schemas.microsoft.com/office/drawing/2014/main" val="20005"/>
-                    </a:ext>
-                  </a:extLst>
-                </a:gridCol>
-              </a:tblGrid>
-              <a:tr h="0">
-                <a:tc>
-                  <a:txBody>
-                    <a:bodyPr/>
-                    <a:lstStyle/>
-                    <a:p>
-                      <a:pPr marL="0" lvl="0" indent="0" algn="l" rtl="0">
-                        <a:spcBef>
-                          <a:spcPts val="0"/>
-                        </a:spcBef>
-                        <a:spcAft>
-                          <a:spcPts val="0"/>
-                        </a:spcAft>
-                        <a:buNone/>
-                      </a:pPr>
-                      <a:r>
-                        <a:rPr lang="fr" sz="600" b="1" i="1" dirty="0"/>
-                        <a:t>R = Réalise; A = Autorité; C = Consulté; </a:t>
-                      </a:r>
-                      <a:r>
-                        <a:rPr lang="fr" sz="600" b="1" i="1" dirty="0">
-                          <a:solidFill>
-                            <a:schemeClr val="dk1"/>
-                          </a:solidFill>
-                        </a:rPr>
-                        <a:t>I = Informé</a:t>
-                      </a:r>
-                      <a:endParaRPr sz="600" b="1" i="1" dirty="0"/>
-                    </a:p>
-                  </a:txBody>
-                  <a:tcPr marL="91425" marR="91425" marT="91425" marB="91425">
-                    <a:lnL w="9525" cap="flat" cmpd="sng">
-                      <a:solidFill>
-                        <a:srgbClr val="9E9E9E"/>
-                      </a:solidFill>
-                      <a:prstDash val="solid"/>
-                      <a:round/>
-                      <a:headEnd type="none" w="sm" len="sm"/>
-                      <a:tailEnd type="none" w="sm" len="sm"/>
-                    </a:lnL>
-                    <a:lnR w="9525" cap="flat" cmpd="sng">
-                      <a:solidFill>
-                        <a:srgbClr val="9E9E9E"/>
-                      </a:solidFill>
-                      <a:prstDash val="solid"/>
-                      <a:round/>
-                      <a:headEnd type="none" w="sm" len="sm"/>
-                      <a:tailEnd type="none" w="sm" len="sm"/>
-                    </a:lnR>
-                    <a:lnT w="9525" cap="flat" cmpd="sng">
-                      <a:solidFill>
-                        <a:srgbClr val="9E9E9E"/>
-                      </a:solidFill>
-                      <a:prstDash val="solid"/>
-                      <a:round/>
-                      <a:headEnd type="none" w="sm" len="sm"/>
-                      <a:tailEnd type="none" w="sm" len="sm"/>
-                    </a:lnT>
-                    <a:lnB w="9525" cap="flat" cmpd="sng">
-                      <a:solidFill>
-                        <a:srgbClr val="9E9E9E"/>
-                      </a:solidFill>
-                      <a:prstDash val="solid"/>
-                      <a:round/>
-                      <a:headEnd type="none" w="sm" len="sm"/>
-                      <a:tailEnd type="none" w="sm" len="sm"/>
-                    </a:lnB>
-                  </a:tcPr>
-                </a:tc>
-                <a:tc gridSpan="5">
-                  <a:txBody>
-                    <a:bodyPr/>
-                    <a:lstStyle/>
-                    <a:p>
-                      <a:pPr marL="0" lvl="0" indent="0" algn="ctr" rtl="0">
-                        <a:spcBef>
-                          <a:spcPts val="0"/>
-                        </a:spcBef>
-                        <a:spcAft>
-                          <a:spcPts val="0"/>
-                        </a:spcAft>
-                        <a:buNone/>
-                      </a:pPr>
-                      <a:r>
-                        <a:rPr lang="fr" sz="1100" b="1" dirty="0">
-                          <a:solidFill>
-                            <a:schemeClr val="dk1"/>
-                          </a:solidFill>
-                          <a:latin typeface="Trebuchet MS"/>
-                          <a:ea typeface="Trebuchet MS"/>
-                          <a:cs typeface="Trebuchet MS"/>
-                          <a:sym typeface="Trebuchet MS"/>
-                        </a:rPr>
-                        <a:t>Acteurs</a:t>
-                      </a:r>
-                      <a:endParaRPr sz="1200" b="1" dirty="0">
-                        <a:solidFill>
-                          <a:schemeClr val="dk1"/>
-                        </a:solidFill>
-                        <a:latin typeface="Trebuchet MS"/>
-                        <a:ea typeface="Trebuchet MS"/>
-                        <a:cs typeface="Trebuchet MS"/>
-                        <a:sym typeface="Trebuchet MS"/>
-                      </a:endParaRPr>
-                    </a:p>
-                  </a:txBody>
-                  <a:tcPr marL="91425" marR="91425" marT="91425" marB="91425">
-                    <a:lnL w="9525" cap="flat" cmpd="sng">
-                      <a:solidFill>
-                        <a:srgbClr val="9E9E9E"/>
-                      </a:solidFill>
-                      <a:prstDash val="solid"/>
-                      <a:round/>
-                      <a:headEnd type="none" w="sm" len="sm"/>
-                      <a:tailEnd type="none" w="sm" len="sm"/>
-                    </a:lnL>
-                    <a:lnR w="9525" cap="flat" cmpd="sng">
-                      <a:solidFill>
-                        <a:srgbClr val="9E9E9E"/>
-                      </a:solidFill>
-                      <a:prstDash val="solid"/>
-                      <a:round/>
-                      <a:headEnd type="none" w="sm" len="sm"/>
-                      <a:tailEnd type="none" w="sm" len="sm"/>
-                    </a:lnR>
-                    <a:lnT w="9525" cap="flat" cmpd="sng">
-                      <a:solidFill>
-                        <a:srgbClr val="9E9E9E"/>
-                      </a:solidFill>
-                      <a:prstDash val="solid"/>
-                      <a:round/>
-                      <a:headEnd type="none" w="sm" len="sm"/>
-                      <a:tailEnd type="none" w="sm" len="sm"/>
-                    </a:lnT>
-                    <a:lnB w="9525" cap="flat" cmpd="sng">
-                      <a:solidFill>
-                        <a:srgbClr val="9E9E9E"/>
-                      </a:solidFill>
-                      <a:prstDash val="solid"/>
-                      <a:round/>
-                      <a:headEnd type="none" w="sm" len="sm"/>
-                      <a:tailEnd type="none" w="sm" len="sm"/>
-                    </a:lnB>
-                  </a:tcPr>
-                </a:tc>
-                <a:tc hMerge="1">
-                  <a:txBody>
-                    <a:bodyPr/>
-                    <a:lstStyle/>
-                    <a:p>
-                      <a:endParaRPr lang="fr-FR"/>
-                    </a:p>
-                  </a:txBody>
-                  <a:tcPr/>
-                </a:tc>
-                <a:tc hMerge="1">
-                  <a:txBody>
-                    <a:bodyPr/>
-                    <a:lstStyle/>
-                    <a:p>
-                      <a:endParaRPr lang="fr-FR"/>
-                    </a:p>
-                  </a:txBody>
-                  <a:tcPr/>
-                </a:tc>
-                <a:tc hMerge="1">
-                  <a:txBody>
-                    <a:bodyPr/>
-                    <a:lstStyle/>
-                    <a:p>
-                      <a:endParaRPr lang="fr-FR"/>
-                    </a:p>
-                  </a:txBody>
-                  <a:tcPr/>
-                </a:tc>
-                <a:tc hMerge="1">
-                  <a:txBody>
-                    <a:bodyPr/>
-                    <a:lstStyle/>
-                    <a:p>
-                      <a:endParaRPr lang="fr-FR"/>
-                    </a:p>
-                  </a:txBody>
-                  <a:tcPr/>
-                </a:tc>
-                <a:extLst>
-                  <a:ext uri="{0D108BD9-81ED-4DB2-BD59-A6C34878D82A}">
-                    <a16:rowId xmlns:a16="http://schemas.microsoft.com/office/drawing/2014/main" val="10000"/>
-                  </a:ext>
-                </a:extLst>
-              </a:tr>
-              <a:tr h="238845">
-                <a:tc>
-                  <a:txBody>
-                    <a:bodyPr/>
-                    <a:lstStyle/>
-                    <a:p>
-                      <a:pPr marL="0" lvl="0" indent="0" algn="ctr" rtl="0">
-                        <a:spcBef>
-                          <a:spcPts val="0"/>
-                        </a:spcBef>
-                        <a:spcAft>
-                          <a:spcPts val="0"/>
-                        </a:spcAft>
-                        <a:buClr>
-                          <a:schemeClr val="dk1"/>
-                        </a:buClr>
-                        <a:buSzPts val="1100"/>
-                        <a:buFont typeface="Arial"/>
-                        <a:buNone/>
-                      </a:pPr>
-                      <a:r>
-                        <a:rPr lang="fr" sz="1200" b="1" dirty="0">
-                          <a:solidFill>
-                            <a:schemeClr val="dk1"/>
-                          </a:solidFill>
-                          <a:latin typeface="Trebuchet MS"/>
-                          <a:ea typeface="Trebuchet MS"/>
-                          <a:cs typeface="Trebuchet MS"/>
-                          <a:sym typeface="Trebuchet MS"/>
-                        </a:rPr>
-                        <a:t>Tâches</a:t>
-                      </a:r>
-                      <a:endParaRPr b="1" dirty="0">
-                        <a:latin typeface="Trebuchet MS"/>
-                        <a:ea typeface="Trebuchet MS"/>
-                        <a:cs typeface="Trebuchet MS"/>
-                        <a:sym typeface="Trebuchet MS"/>
-                      </a:endParaRPr>
-                    </a:p>
-                  </a:txBody>
-                  <a:tcPr marL="91425" marR="91425" marT="91425" marB="91425">
-                    <a:lnR w="9525" cap="flat" cmpd="sng">
-                      <a:solidFill>
-                        <a:srgbClr val="9E9E9E"/>
-                      </a:solidFill>
-                      <a:prstDash val="solid"/>
-                      <a:round/>
-                      <a:headEnd type="none" w="sm" len="sm"/>
-                      <a:tailEnd type="none" w="sm" len="sm"/>
-                    </a:lnR>
-                    <a:lnT w="9525" cap="flat" cmpd="sng">
-                      <a:solidFill>
-                        <a:srgbClr val="9E9E9E"/>
-                      </a:solidFill>
-                      <a:prstDash val="solid"/>
-                      <a:round/>
-                      <a:headEnd type="none" w="sm" len="sm"/>
-                      <a:tailEnd type="none" w="sm" len="sm"/>
-                    </a:lnT>
-                  </a:tcPr>
-                </a:tc>
-                <a:tc>
-                  <a:txBody>
-                    <a:bodyPr/>
-                    <a:lstStyle/>
-                    <a:p>
-                      <a:pPr marL="0" lvl="0" indent="0" algn="ctr" rtl="0">
-                        <a:spcBef>
-                          <a:spcPts val="0"/>
-                        </a:spcBef>
-                        <a:spcAft>
-                          <a:spcPts val="0"/>
-                        </a:spcAft>
-                        <a:buNone/>
-                      </a:pPr>
-                      <a:r>
-                        <a:rPr lang="fr" sz="1050" dirty="0"/>
-                        <a:t>Lucas</a:t>
-                      </a:r>
-                      <a:endParaRPr sz="1200" dirty="0"/>
-                    </a:p>
-                  </a:txBody>
-                  <a:tcPr marL="91425" marR="91425" marT="91425" marB="91425">
-                    <a:lnL w="9525" cap="flat" cmpd="sng">
-                      <a:solidFill>
-                        <a:srgbClr val="9E9E9E"/>
-                      </a:solidFill>
-                      <a:prstDash val="solid"/>
-                      <a:round/>
-                      <a:headEnd type="none" w="sm" len="sm"/>
-                      <a:tailEnd type="none" w="sm" len="sm"/>
-                    </a:lnL>
-                    <a:lnR w="9525" cap="flat" cmpd="sng">
-                      <a:solidFill>
-                        <a:srgbClr val="9E9E9E"/>
-                      </a:solidFill>
-                      <a:prstDash val="solid"/>
-                      <a:round/>
-                      <a:headEnd type="none" w="sm" len="sm"/>
-                      <a:tailEnd type="none" w="sm" len="sm"/>
-                    </a:lnR>
-                    <a:lnT w="9525" cap="flat" cmpd="sng">
-                      <a:solidFill>
-                        <a:srgbClr val="9E9E9E"/>
-                      </a:solidFill>
-                      <a:prstDash val="solid"/>
-                      <a:round/>
-                      <a:headEnd type="none" w="sm" len="sm"/>
-                      <a:tailEnd type="none" w="sm" len="sm"/>
-                    </a:lnT>
-                    <a:lnB w="9525" cap="flat" cmpd="sng">
-                      <a:solidFill>
-                        <a:srgbClr val="9E9E9E"/>
-                      </a:solidFill>
-                      <a:prstDash val="solid"/>
-                      <a:round/>
-                      <a:headEnd type="none" w="sm" len="sm"/>
-                      <a:tailEnd type="none" w="sm" len="sm"/>
-                    </a:lnB>
-                  </a:tcPr>
-                </a:tc>
-                <a:tc>
-                  <a:txBody>
-                    <a:bodyPr/>
-                    <a:lstStyle/>
-                    <a:p>
-                      <a:pPr marL="0" lvl="0" indent="0" algn="ctr" rtl="0">
-                        <a:spcBef>
-                          <a:spcPts val="0"/>
-                        </a:spcBef>
-                        <a:spcAft>
-                          <a:spcPts val="0"/>
-                        </a:spcAft>
-                        <a:buNone/>
-                      </a:pPr>
-                      <a:r>
-                        <a:rPr lang="fr" sz="1050" dirty="0"/>
-                        <a:t>Noé</a:t>
-                      </a:r>
-                      <a:endParaRPr sz="1200" dirty="0"/>
-                    </a:p>
-                  </a:txBody>
-                  <a:tcPr marL="91425" marR="91425" marT="91425" marB="91425">
-                    <a:lnL w="9525" cap="flat" cmpd="sng">
-                      <a:solidFill>
-                        <a:srgbClr val="9E9E9E"/>
-                      </a:solidFill>
-                      <a:prstDash val="solid"/>
-                      <a:round/>
-                      <a:headEnd type="none" w="sm" len="sm"/>
-                      <a:tailEnd type="none" w="sm" len="sm"/>
-                    </a:lnL>
-                    <a:lnR w="9525" cap="flat" cmpd="sng">
-                      <a:solidFill>
-                        <a:srgbClr val="9E9E9E"/>
-                      </a:solidFill>
-                      <a:prstDash val="solid"/>
-                      <a:round/>
-                      <a:headEnd type="none" w="sm" len="sm"/>
-                      <a:tailEnd type="none" w="sm" len="sm"/>
-                    </a:lnR>
-                    <a:lnT w="9525" cap="flat" cmpd="sng">
-                      <a:solidFill>
-                        <a:srgbClr val="9E9E9E"/>
-                      </a:solidFill>
-                      <a:prstDash val="solid"/>
-                      <a:round/>
-                      <a:headEnd type="none" w="sm" len="sm"/>
-                      <a:tailEnd type="none" w="sm" len="sm"/>
-                    </a:lnT>
-                    <a:lnB w="9525" cap="flat" cmpd="sng">
-                      <a:solidFill>
-                        <a:srgbClr val="9E9E9E"/>
-                      </a:solidFill>
-                      <a:prstDash val="solid"/>
-                      <a:round/>
-                      <a:headEnd type="none" w="sm" len="sm"/>
-                      <a:tailEnd type="none" w="sm" len="sm"/>
-                    </a:lnB>
-                  </a:tcPr>
-                </a:tc>
-                <a:tc>
-                  <a:txBody>
-                    <a:bodyPr/>
-                    <a:lstStyle/>
-                    <a:p>
-                      <a:pPr marL="0" lvl="0" indent="0" algn="ctr" rtl="0">
-                        <a:spcBef>
-                          <a:spcPts val="0"/>
-                        </a:spcBef>
-                        <a:spcAft>
-                          <a:spcPts val="0"/>
-                        </a:spcAft>
-                        <a:buNone/>
-                      </a:pPr>
-                      <a:r>
-                        <a:rPr lang="fr" sz="1050" dirty="0"/>
-                        <a:t>Alexis</a:t>
-                      </a:r>
-                      <a:endParaRPr sz="1200" dirty="0"/>
-                    </a:p>
-                  </a:txBody>
-                  <a:tcPr marL="91425" marR="91425" marT="91425" marB="91425">
-                    <a:lnL w="9525" cap="flat" cmpd="sng">
-                      <a:solidFill>
-                        <a:srgbClr val="9E9E9E"/>
-                      </a:solidFill>
-                      <a:prstDash val="solid"/>
-                      <a:round/>
-                      <a:headEnd type="none" w="sm" len="sm"/>
-                      <a:tailEnd type="none" w="sm" len="sm"/>
-                    </a:lnL>
-                    <a:lnR w="9525" cap="flat" cmpd="sng">
-                      <a:solidFill>
-                        <a:srgbClr val="9E9E9E"/>
-                      </a:solidFill>
-                      <a:prstDash val="solid"/>
-                      <a:round/>
-                      <a:headEnd type="none" w="sm" len="sm"/>
-                      <a:tailEnd type="none" w="sm" len="sm"/>
-                    </a:lnR>
-                    <a:lnT w="9525" cap="flat" cmpd="sng">
-                      <a:solidFill>
-                        <a:srgbClr val="9E9E9E"/>
-                      </a:solidFill>
-                      <a:prstDash val="solid"/>
-                      <a:round/>
-                      <a:headEnd type="none" w="sm" len="sm"/>
-                      <a:tailEnd type="none" w="sm" len="sm"/>
-                    </a:lnT>
-                    <a:lnB w="9525" cap="flat" cmpd="sng">
-                      <a:solidFill>
-                        <a:srgbClr val="9E9E9E"/>
-                      </a:solidFill>
-                      <a:prstDash val="solid"/>
-                      <a:round/>
-                      <a:headEnd type="none" w="sm" len="sm"/>
-                      <a:tailEnd type="none" w="sm" len="sm"/>
-                    </a:lnB>
-                  </a:tcPr>
-                </a:tc>
-                <a:tc>
-                  <a:txBody>
-                    <a:bodyPr/>
-                    <a:lstStyle/>
-                    <a:p>
-                      <a:pPr marL="0" lvl="0" indent="0" algn="ctr" rtl="0">
-                        <a:spcBef>
-                          <a:spcPts val="0"/>
-                        </a:spcBef>
-                        <a:spcAft>
-                          <a:spcPts val="0"/>
-                        </a:spcAft>
-                        <a:buNone/>
-                      </a:pPr>
-                      <a:r>
-                        <a:rPr lang="fr-FR" sz="1050" dirty="0"/>
-                        <a:t>Matthias</a:t>
-                      </a:r>
-                      <a:endParaRPr sz="1200" dirty="0"/>
-                    </a:p>
-                  </a:txBody>
-                  <a:tcPr marL="91425" marR="91425" marT="91425" marB="91425">
-                    <a:lnL w="9525" cap="flat" cmpd="sng">
-                      <a:solidFill>
-                        <a:srgbClr val="9E9E9E"/>
-                      </a:solidFill>
-                      <a:prstDash val="solid"/>
-                      <a:round/>
-                      <a:headEnd type="none" w="sm" len="sm"/>
-                      <a:tailEnd type="none" w="sm" len="sm"/>
-                    </a:lnL>
-                    <a:lnR w="9525" cap="flat" cmpd="sng">
-                      <a:solidFill>
-                        <a:srgbClr val="9E9E9E"/>
-                      </a:solidFill>
-                      <a:prstDash val="solid"/>
-                      <a:round/>
-                      <a:headEnd type="none" w="sm" len="sm"/>
-                      <a:tailEnd type="none" w="sm" len="sm"/>
-                    </a:lnR>
-                    <a:lnT w="9525" cap="flat" cmpd="sng">
-                      <a:solidFill>
-                        <a:srgbClr val="9E9E9E"/>
-                      </a:solidFill>
-                      <a:prstDash val="solid"/>
-                      <a:round/>
-                      <a:headEnd type="none" w="sm" len="sm"/>
-                      <a:tailEnd type="none" w="sm" len="sm"/>
-                    </a:lnT>
-                    <a:lnB w="9525" cap="flat" cmpd="sng">
-                      <a:solidFill>
-                        <a:srgbClr val="9E9E9E"/>
-                      </a:solidFill>
-                      <a:prstDash val="solid"/>
-                      <a:round/>
-                      <a:headEnd type="none" w="sm" len="sm"/>
-                      <a:tailEnd type="none" w="sm" len="sm"/>
-                    </a:lnB>
-                  </a:tcPr>
-                </a:tc>
-                <a:tc>
-                  <a:txBody>
-                    <a:bodyPr/>
-                    <a:lstStyle/>
-                    <a:p>
-                      <a:pPr marL="0" lvl="0" indent="0" algn="ctr" rtl="0">
-                        <a:spcBef>
-                          <a:spcPts val="0"/>
-                        </a:spcBef>
-                        <a:spcAft>
-                          <a:spcPts val="0"/>
-                        </a:spcAft>
-                        <a:buNone/>
-                      </a:pPr>
-                      <a:r>
-                        <a:rPr lang="fr-FR" sz="1050" dirty="0"/>
-                        <a:t>Autres élèves</a:t>
-                      </a:r>
-                      <a:endParaRPr sz="1050" dirty="0"/>
-                    </a:p>
-                  </a:txBody>
-                  <a:tcPr marL="91425" marR="91425" marT="91425" marB="91425">
-                    <a:lnL w="9525" cap="flat" cmpd="sng">
-                      <a:solidFill>
-                        <a:srgbClr val="9E9E9E"/>
-                      </a:solidFill>
-                      <a:prstDash val="solid"/>
-                      <a:round/>
-                      <a:headEnd type="none" w="sm" len="sm"/>
-                      <a:tailEnd type="none" w="sm" len="sm"/>
-                    </a:lnL>
-                    <a:lnR w="9525" cap="flat" cmpd="sng">
-                      <a:solidFill>
-                        <a:srgbClr val="9E9E9E"/>
-                      </a:solidFill>
-                      <a:prstDash val="solid"/>
-                      <a:round/>
-                      <a:headEnd type="none" w="sm" len="sm"/>
-                      <a:tailEnd type="none" w="sm" len="sm"/>
-                    </a:lnR>
-                    <a:lnT w="9525" cap="flat" cmpd="sng">
-                      <a:solidFill>
-                        <a:srgbClr val="9E9E9E"/>
-                      </a:solidFill>
-                      <a:prstDash val="solid"/>
-                      <a:round/>
-                      <a:headEnd type="none" w="sm" len="sm"/>
-                      <a:tailEnd type="none" w="sm" len="sm"/>
-                    </a:lnT>
-                    <a:lnB w="9525" cap="flat" cmpd="sng">
-                      <a:solidFill>
-                        <a:srgbClr val="9E9E9E"/>
-                      </a:solidFill>
-                      <a:prstDash val="solid"/>
-                      <a:round/>
-                      <a:headEnd type="none" w="sm" len="sm"/>
-                      <a:tailEnd type="none" w="sm" len="sm"/>
-                    </a:lnB>
-                  </a:tcPr>
-                </a:tc>
-                <a:extLst>
-                  <a:ext uri="{0D108BD9-81ED-4DB2-BD59-A6C34878D82A}">
-                    <a16:rowId xmlns:a16="http://schemas.microsoft.com/office/drawing/2014/main" val="10001"/>
-                  </a:ext>
-                </a:extLst>
-              </a:tr>
-              <a:tr h="419561">
-                <a:tc>
-                  <a:txBody>
-                    <a:bodyPr/>
-                    <a:lstStyle/>
-                    <a:p>
-                      <a:pPr marL="0" lvl="0" indent="0" algn="l" rtl="0">
-                        <a:spcBef>
-                          <a:spcPts val="0"/>
-                        </a:spcBef>
-                        <a:spcAft>
-                          <a:spcPts val="0"/>
-                        </a:spcAft>
-                        <a:buNone/>
-                      </a:pPr>
-                      <a:r>
-                        <a:rPr lang="fr" sz="900" dirty="0"/>
-                        <a:t>établir le cahier des charges</a:t>
-                      </a:r>
-                      <a:endParaRPr sz="900" dirty="0"/>
-                    </a:p>
-                  </a:txBody>
-                  <a:tcPr marL="91425" marR="91425" marT="91425" marB="91425"/>
-                </a:tc>
-                <a:tc>
-                  <a:txBody>
-                    <a:bodyPr/>
-                    <a:lstStyle/>
-                    <a:p>
-                      <a:pPr marL="0" lvl="0" indent="0" algn="ctr" rtl="0">
-                        <a:spcBef>
-                          <a:spcPts val="0"/>
-                        </a:spcBef>
-                        <a:spcAft>
-                          <a:spcPts val="0"/>
-                        </a:spcAft>
-                        <a:buNone/>
-                      </a:pPr>
-                      <a:r>
-                        <a:rPr lang="fr" sz="1100" b="1" dirty="0"/>
-                        <a:t>R</a:t>
-                      </a:r>
-                      <a:endParaRPr sz="1100" b="1" dirty="0"/>
-                    </a:p>
-                  </a:txBody>
-                  <a:tcPr marL="91425" marR="91425" marT="91425" marB="91425" anchor="ctr">
-                    <a:lnT w="9525" cap="flat" cmpd="sng">
-                      <a:solidFill>
-                        <a:srgbClr val="9E9E9E"/>
-                      </a:solidFill>
-                      <a:prstDash val="solid"/>
-                      <a:round/>
-                      <a:headEnd type="none" w="sm" len="sm"/>
-                      <a:tailEnd type="none" w="sm" len="sm"/>
-                    </a:lnT>
-                  </a:tcPr>
-                </a:tc>
-                <a:tc>
-                  <a:txBody>
-                    <a:bodyPr/>
-                    <a:lstStyle/>
-                    <a:p>
-                      <a:pPr marL="0" lvl="0" indent="0" algn="ctr" rtl="0">
-                        <a:spcBef>
-                          <a:spcPts val="0"/>
-                        </a:spcBef>
-                        <a:spcAft>
-                          <a:spcPts val="0"/>
-                        </a:spcAft>
-                        <a:buNone/>
-                      </a:pPr>
-                      <a:r>
-                        <a:rPr lang="fr" sz="1100" b="1" dirty="0"/>
-                        <a:t>R</a:t>
-                      </a:r>
-                      <a:endParaRPr sz="1100" b="1" dirty="0"/>
-                    </a:p>
-                  </a:txBody>
-                  <a:tcPr marL="91425" marR="91425" marT="91425" marB="91425" anchor="ctr">
-                    <a:lnT w="9525" cap="flat" cmpd="sng">
-                      <a:solidFill>
-                        <a:srgbClr val="9E9E9E"/>
-                      </a:solidFill>
-                      <a:prstDash val="solid"/>
-                      <a:round/>
-                      <a:headEnd type="none" w="sm" len="sm"/>
-                      <a:tailEnd type="none" w="sm" len="sm"/>
-                    </a:lnT>
-                  </a:tcPr>
-                </a:tc>
-                <a:tc>
-                  <a:txBody>
-                    <a:bodyPr/>
-                    <a:lstStyle/>
-                    <a:p>
-                      <a:pPr marL="0" lvl="0" indent="0" algn="ctr" rtl="0">
-                        <a:spcBef>
-                          <a:spcPts val="0"/>
-                        </a:spcBef>
-                        <a:spcAft>
-                          <a:spcPts val="0"/>
-                        </a:spcAft>
-                        <a:buNone/>
-                      </a:pPr>
-                      <a:r>
-                        <a:rPr lang="fr" sz="1100" b="1" dirty="0"/>
-                        <a:t>AR</a:t>
-                      </a:r>
-                      <a:endParaRPr b="1" dirty="0"/>
-                    </a:p>
-                  </a:txBody>
-                  <a:tcPr marL="91425" marR="91425" marT="91425" marB="91425" anchor="ctr">
-                    <a:lnT w="9525" cap="flat" cmpd="sng">
-                      <a:solidFill>
-                        <a:srgbClr val="9E9E9E"/>
-                      </a:solidFill>
-                      <a:prstDash val="solid"/>
-                      <a:round/>
-                      <a:headEnd type="none" w="sm" len="sm"/>
-                      <a:tailEnd type="none" w="sm" len="sm"/>
-                    </a:lnT>
-                  </a:tcPr>
-                </a:tc>
-                <a:tc>
-                  <a:txBody>
-                    <a:bodyPr/>
-                    <a:lstStyle/>
-                    <a:p>
-                      <a:pPr marL="0" lvl="0" indent="0" algn="ctr" rtl="0">
-                        <a:spcBef>
-                          <a:spcPts val="0"/>
-                        </a:spcBef>
-                        <a:spcAft>
-                          <a:spcPts val="0"/>
-                        </a:spcAft>
-                        <a:buNone/>
-                      </a:pPr>
-                      <a:r>
-                        <a:rPr lang="fr" sz="1100" b="1" dirty="0"/>
-                        <a:t>R</a:t>
-                      </a:r>
-                      <a:endParaRPr b="1" dirty="0"/>
-                    </a:p>
-                  </a:txBody>
-                  <a:tcPr marL="91425" marR="91425" marT="91425" marB="91425" anchor="ctr">
-                    <a:lnT w="9525" cap="flat" cmpd="sng">
-                      <a:solidFill>
-                        <a:srgbClr val="9E9E9E"/>
-                      </a:solidFill>
-                      <a:prstDash val="solid"/>
-                      <a:round/>
-                      <a:headEnd type="none" w="sm" len="sm"/>
-                      <a:tailEnd type="none" w="sm" len="sm"/>
-                    </a:lnT>
-                  </a:tcPr>
-                </a:tc>
-                <a:tc>
-                  <a:txBody>
-                    <a:bodyPr/>
-                    <a:lstStyle/>
-                    <a:p>
-                      <a:pPr marL="0" lvl="0" indent="0" algn="ctr" rtl="0">
-                        <a:spcBef>
-                          <a:spcPts val="0"/>
-                        </a:spcBef>
-                        <a:spcAft>
-                          <a:spcPts val="0"/>
-                        </a:spcAft>
-                        <a:buNone/>
-                      </a:pPr>
-                      <a:endParaRPr b="1" dirty="0"/>
-                    </a:p>
-                  </a:txBody>
-                  <a:tcPr marL="91425" marR="91425" marT="91425" marB="91425" anchor="ctr">
-                    <a:lnT w="9525" cap="flat" cmpd="sng">
-                      <a:solidFill>
-                        <a:srgbClr val="9E9E9E"/>
-                      </a:solidFill>
-                      <a:prstDash val="solid"/>
-                      <a:round/>
-                      <a:headEnd type="none" w="sm" len="sm"/>
-                      <a:tailEnd type="none" w="sm" len="sm"/>
-                    </a:lnT>
-                  </a:tcPr>
-                </a:tc>
-                <a:extLst>
-                  <a:ext uri="{0D108BD9-81ED-4DB2-BD59-A6C34878D82A}">
-                    <a16:rowId xmlns:a16="http://schemas.microsoft.com/office/drawing/2014/main" val="10002"/>
-                  </a:ext>
-                </a:extLst>
-              </a:tr>
-              <a:tr h="0">
-                <a:tc>
-                  <a:txBody>
-                    <a:bodyPr/>
-                    <a:lstStyle/>
-                    <a:p>
-                      <a:pPr marL="0" lvl="0" indent="0" algn="l" rtl="0">
-                        <a:spcBef>
-                          <a:spcPts val="0"/>
-                        </a:spcBef>
-                        <a:spcAft>
-                          <a:spcPts val="0"/>
-                        </a:spcAft>
-                        <a:buNone/>
-                      </a:pPr>
-                      <a:r>
-                        <a:rPr lang="fr-FR" sz="900" dirty="0"/>
-                        <a:t>Base de données</a:t>
-                      </a:r>
-                      <a:endParaRPr sz="900" dirty="0"/>
-                    </a:p>
-                  </a:txBody>
-                  <a:tcPr marL="91425" marR="91425" marT="91425" marB="91425">
-                    <a:solidFill>
-                      <a:schemeClr val="accent2">
-                        <a:lumMod val="25000"/>
-                        <a:lumOff val="75000"/>
-                      </a:schemeClr>
-                    </a:solidFill>
-                  </a:tcPr>
-                </a:tc>
-                <a:tc>
-                  <a:txBody>
-                    <a:bodyPr/>
-                    <a:lstStyle/>
-                    <a:p>
-                      <a:pPr marL="0" lvl="0" indent="0" algn="l" rtl="0">
-                        <a:spcBef>
-                          <a:spcPts val="0"/>
-                        </a:spcBef>
-                        <a:spcAft>
-                          <a:spcPts val="0"/>
-                        </a:spcAft>
-                        <a:buNone/>
-                      </a:pPr>
-                      <a:endParaRPr dirty="0"/>
-                    </a:p>
-                  </a:txBody>
-                  <a:tcPr marL="91425" marR="91425" marT="91425" marB="91425" anchor="ctr">
-                    <a:solidFill>
-                      <a:schemeClr val="accent2">
-                        <a:lumMod val="25000"/>
-                        <a:lumOff val="75000"/>
-                      </a:schemeClr>
-                    </a:solidFill>
-                  </a:tcPr>
-                </a:tc>
-                <a:tc>
-                  <a:txBody>
-                    <a:bodyPr/>
-                    <a:lstStyle/>
-                    <a:p>
-                      <a:pPr marL="0" lvl="0" indent="0" algn="l" rtl="0">
-                        <a:spcBef>
-                          <a:spcPts val="0"/>
-                        </a:spcBef>
-                        <a:spcAft>
-                          <a:spcPts val="0"/>
-                        </a:spcAft>
-                        <a:buNone/>
-                      </a:pPr>
-                      <a:endParaRPr dirty="0"/>
-                    </a:p>
-                  </a:txBody>
-                  <a:tcPr marL="91425" marR="91425" marT="91425" marB="91425" anchor="ctr">
-                    <a:solidFill>
-                      <a:schemeClr val="accent2">
-                        <a:lumMod val="25000"/>
-                        <a:lumOff val="75000"/>
-                      </a:schemeClr>
-                    </a:solidFill>
-                  </a:tcPr>
-                </a:tc>
-                <a:tc>
-                  <a:txBody>
-                    <a:bodyPr/>
-                    <a:lstStyle/>
-                    <a:p>
-                      <a:pPr marL="0" lvl="0" indent="0" algn="l" rtl="0">
-                        <a:spcBef>
-                          <a:spcPts val="0"/>
-                        </a:spcBef>
-                        <a:spcAft>
-                          <a:spcPts val="0"/>
-                        </a:spcAft>
-                        <a:buNone/>
-                      </a:pPr>
-                      <a:endParaRPr dirty="0"/>
-                    </a:p>
-                  </a:txBody>
-                  <a:tcPr marL="91425" marR="91425" marT="91425" marB="91425" anchor="ctr">
-                    <a:solidFill>
-                      <a:schemeClr val="accent2">
-                        <a:lumMod val="25000"/>
-                        <a:lumOff val="75000"/>
-                      </a:schemeClr>
-                    </a:solidFill>
-                  </a:tcPr>
-                </a:tc>
-                <a:tc>
-                  <a:txBody>
-                    <a:bodyPr/>
-                    <a:lstStyle/>
-                    <a:p>
-                      <a:pPr marL="0" lvl="0" indent="0" algn="l" rtl="0">
-                        <a:spcBef>
-                          <a:spcPts val="0"/>
-                        </a:spcBef>
-                        <a:spcAft>
-                          <a:spcPts val="0"/>
-                        </a:spcAft>
-                        <a:buNone/>
-                      </a:pPr>
-                      <a:endParaRPr dirty="0"/>
-                    </a:p>
-                  </a:txBody>
-                  <a:tcPr marL="91425" marR="91425" marT="91425" marB="91425" anchor="ctr">
-                    <a:solidFill>
-                      <a:schemeClr val="accent2">
-                        <a:lumMod val="25000"/>
-                        <a:lumOff val="75000"/>
-                      </a:schemeClr>
-                    </a:solidFill>
-                  </a:tcPr>
-                </a:tc>
-                <a:tc>
-                  <a:txBody>
-                    <a:bodyPr/>
-                    <a:lstStyle/>
-                    <a:p>
-                      <a:pPr marL="0" lvl="0" indent="0" algn="l" rtl="0">
-                        <a:spcBef>
-                          <a:spcPts val="0"/>
-                        </a:spcBef>
-                        <a:spcAft>
-                          <a:spcPts val="0"/>
-                        </a:spcAft>
-                        <a:buNone/>
-                      </a:pPr>
-                      <a:endParaRPr dirty="0"/>
-                    </a:p>
-                  </a:txBody>
-                  <a:tcPr marL="91425" marR="91425" marT="91425" marB="91425" anchor="ctr">
-                    <a:solidFill>
-                      <a:schemeClr val="accent2">
-                        <a:lumMod val="25000"/>
-                        <a:lumOff val="75000"/>
-                      </a:schemeClr>
-                    </a:solidFill>
-                  </a:tcPr>
-                </a:tc>
-                <a:extLst>
-                  <a:ext uri="{0D108BD9-81ED-4DB2-BD59-A6C34878D82A}">
-                    <a16:rowId xmlns:a16="http://schemas.microsoft.com/office/drawing/2014/main" val="4043846025"/>
-                  </a:ext>
-                </a:extLst>
-              </a:tr>
-              <a:tr h="0">
-                <a:tc>
-                  <a:txBody>
-                    <a:bodyPr/>
-                    <a:lstStyle/>
-                    <a:p>
-                      <a:pPr marL="0" lvl="0" indent="0" algn="l" rtl="0">
-                        <a:spcBef>
-                          <a:spcPts val="0"/>
-                        </a:spcBef>
-                        <a:spcAft>
-                          <a:spcPts val="0"/>
-                        </a:spcAft>
-                        <a:buNone/>
-                      </a:pPr>
-                      <a:r>
-                        <a:rPr lang="fr-FR" sz="900" dirty="0"/>
-                        <a:t>Schéma relationnel base de données</a:t>
-                      </a:r>
-                      <a:endParaRPr sz="900" dirty="0"/>
-                    </a:p>
-                  </a:txBody>
-                  <a:tcPr marL="91425" marR="91425" marT="91425" marB="91425"/>
-                </a:tc>
-                <a:tc>
-                  <a:txBody>
-                    <a:bodyPr/>
-                    <a:lstStyle/>
-                    <a:p>
-                      <a:pPr marL="0" lvl="0" indent="0" algn="l" rtl="0">
-                        <a:spcBef>
-                          <a:spcPts val="0"/>
-                        </a:spcBef>
-                        <a:spcAft>
-                          <a:spcPts val="0"/>
-                        </a:spcAft>
-                        <a:buNone/>
-                      </a:pPr>
-                      <a:endParaRPr dirty="0"/>
-                    </a:p>
-                  </a:txBody>
-                  <a:tcPr marL="91425" marR="91425" marT="91425" marB="91425" anchor="ctr"/>
-                </a:tc>
-                <a:tc>
-                  <a:txBody>
-                    <a:bodyPr/>
-                    <a:lstStyle/>
-                    <a:p>
-                      <a:pPr marL="0" lvl="0" indent="0" algn="l" rtl="0">
-                        <a:spcBef>
-                          <a:spcPts val="0"/>
-                        </a:spcBef>
-                        <a:spcAft>
-                          <a:spcPts val="0"/>
-                        </a:spcAft>
-                        <a:buNone/>
-                      </a:pPr>
-                      <a:endParaRPr dirty="0"/>
-                    </a:p>
-                  </a:txBody>
-                  <a:tcPr marL="91425" marR="91425" marT="91425" marB="91425" anchor="ctr"/>
-                </a:tc>
-                <a:tc>
-                  <a:txBody>
-                    <a:bodyPr/>
-                    <a:lstStyle/>
-                    <a:p>
-                      <a:pPr marL="0" lvl="0" indent="0" algn="l" rtl="0">
-                        <a:spcBef>
-                          <a:spcPts val="0"/>
-                        </a:spcBef>
-                        <a:spcAft>
-                          <a:spcPts val="0"/>
-                        </a:spcAft>
-                        <a:buNone/>
-                      </a:pPr>
-                      <a:endParaRPr dirty="0"/>
-                    </a:p>
-                  </a:txBody>
-                  <a:tcPr marL="91425" marR="91425" marT="91425" marB="91425" anchor="ctr"/>
-                </a:tc>
-                <a:tc>
-                  <a:txBody>
-                    <a:bodyPr/>
-                    <a:lstStyle/>
-                    <a:p>
-                      <a:pPr marL="0" lvl="0" indent="0" algn="l" rtl="0">
-                        <a:spcBef>
-                          <a:spcPts val="0"/>
-                        </a:spcBef>
-                        <a:spcAft>
-                          <a:spcPts val="0"/>
-                        </a:spcAft>
-                        <a:buNone/>
-                      </a:pPr>
-                      <a:endParaRPr/>
-                    </a:p>
-                  </a:txBody>
-                  <a:tcPr marL="91425" marR="91425" marT="91425" marB="91425" anchor="ctr"/>
-                </a:tc>
-                <a:tc>
-                  <a:txBody>
-                    <a:bodyPr/>
-                    <a:lstStyle/>
-                    <a:p>
-                      <a:pPr marL="0" lvl="0" indent="0" algn="l" rtl="0">
-                        <a:spcBef>
-                          <a:spcPts val="0"/>
-                        </a:spcBef>
-                        <a:spcAft>
-                          <a:spcPts val="0"/>
-                        </a:spcAft>
-                        <a:buNone/>
-                      </a:pPr>
-                      <a:endParaRPr dirty="0"/>
-                    </a:p>
-                  </a:txBody>
-                  <a:tcPr marL="91425" marR="91425" marT="91425" marB="91425" anchor="ctr"/>
-                </a:tc>
-                <a:extLst>
-                  <a:ext uri="{0D108BD9-81ED-4DB2-BD59-A6C34878D82A}">
-                    <a16:rowId xmlns:a16="http://schemas.microsoft.com/office/drawing/2014/main" val="2743816925"/>
-                  </a:ext>
-                </a:extLst>
-              </a:tr>
-              <a:tr h="0">
-                <a:tc>
-                  <a:txBody>
-                    <a:bodyPr/>
-                    <a:lstStyle/>
-                    <a:p>
-                      <a:pPr marL="0" lvl="0" indent="0" algn="l" rtl="0">
-                        <a:spcBef>
-                          <a:spcPts val="0"/>
-                        </a:spcBef>
-                        <a:spcAft>
-                          <a:spcPts val="0"/>
-                        </a:spcAft>
-                        <a:buNone/>
-                      </a:pPr>
-                      <a:r>
-                        <a:rPr lang="fr-FR" sz="900" dirty="0"/>
-                        <a:t>Conception requêtes</a:t>
-                      </a:r>
-                      <a:endParaRPr sz="900" dirty="0"/>
-                    </a:p>
-                  </a:txBody>
-                  <a:tcPr marL="91425" marR="91425" marT="91425" marB="91425"/>
-                </a:tc>
-                <a:tc>
-                  <a:txBody>
-                    <a:bodyPr/>
-                    <a:lstStyle/>
-                    <a:p>
-                      <a:pPr marL="0" lvl="0" indent="0" algn="l" rtl="0">
-                        <a:spcBef>
-                          <a:spcPts val="0"/>
-                        </a:spcBef>
-                        <a:spcAft>
-                          <a:spcPts val="0"/>
-                        </a:spcAft>
-                        <a:buNone/>
-                      </a:pPr>
-                      <a:endParaRPr/>
-                    </a:p>
-                  </a:txBody>
-                  <a:tcPr marL="91425" marR="91425" marT="91425" marB="91425" anchor="ctr"/>
-                </a:tc>
-                <a:tc>
-                  <a:txBody>
-                    <a:bodyPr/>
-                    <a:lstStyle/>
-                    <a:p>
-                      <a:pPr marL="0" lvl="0" indent="0" algn="l" rtl="0">
-                        <a:spcBef>
-                          <a:spcPts val="0"/>
-                        </a:spcBef>
-                        <a:spcAft>
-                          <a:spcPts val="0"/>
-                        </a:spcAft>
-                        <a:buNone/>
-                      </a:pPr>
-                      <a:endParaRPr/>
-                    </a:p>
-                  </a:txBody>
-                  <a:tcPr marL="91425" marR="91425" marT="91425" marB="91425" anchor="ctr"/>
-                </a:tc>
-                <a:tc>
-                  <a:txBody>
-                    <a:bodyPr/>
-                    <a:lstStyle/>
-                    <a:p>
-                      <a:pPr marL="0" lvl="0" indent="0" algn="l" rtl="0">
-                        <a:spcBef>
-                          <a:spcPts val="0"/>
-                        </a:spcBef>
-                        <a:spcAft>
-                          <a:spcPts val="0"/>
-                        </a:spcAft>
-                        <a:buNone/>
-                      </a:pPr>
-                      <a:endParaRPr/>
-                    </a:p>
-                  </a:txBody>
-                  <a:tcPr marL="91425" marR="91425" marT="91425" marB="91425" anchor="ctr"/>
-                </a:tc>
-                <a:tc>
-                  <a:txBody>
-                    <a:bodyPr/>
-                    <a:lstStyle/>
-                    <a:p>
-                      <a:pPr marL="0" lvl="0" indent="0" algn="l" rtl="0">
-                        <a:spcBef>
-                          <a:spcPts val="0"/>
-                        </a:spcBef>
-                        <a:spcAft>
-                          <a:spcPts val="0"/>
-                        </a:spcAft>
-                        <a:buNone/>
-                      </a:pPr>
-                      <a:endParaRPr/>
-                    </a:p>
-                  </a:txBody>
-                  <a:tcPr marL="91425" marR="91425" marT="91425" marB="91425" anchor="ctr"/>
-                </a:tc>
-                <a:tc>
-                  <a:txBody>
-                    <a:bodyPr/>
-                    <a:lstStyle/>
-                    <a:p>
-                      <a:pPr marL="0" lvl="0" indent="0" algn="l" rtl="0">
-                        <a:spcBef>
-                          <a:spcPts val="0"/>
-                        </a:spcBef>
-                        <a:spcAft>
-                          <a:spcPts val="0"/>
-                        </a:spcAft>
-                        <a:buNone/>
-                      </a:pPr>
-                      <a:endParaRPr dirty="0"/>
-                    </a:p>
-                  </a:txBody>
-                  <a:tcPr marL="91425" marR="91425" marT="91425" marB="91425" anchor="ctr"/>
-                </a:tc>
-                <a:extLst>
-                  <a:ext uri="{0D108BD9-81ED-4DB2-BD59-A6C34878D82A}">
-                    <a16:rowId xmlns:a16="http://schemas.microsoft.com/office/drawing/2014/main" val="841853150"/>
-                  </a:ext>
-                </a:extLst>
-              </a:tr>
-              <a:tr h="0">
-                <a:tc>
-                  <a:txBody>
-                    <a:bodyPr/>
-                    <a:lstStyle/>
-                    <a:p>
-                      <a:pPr marL="0" lvl="0" indent="0" algn="l" rtl="0">
-                        <a:spcBef>
-                          <a:spcPts val="0"/>
-                        </a:spcBef>
-                        <a:spcAft>
-                          <a:spcPts val="0"/>
-                        </a:spcAft>
-                        <a:buNone/>
-                      </a:pPr>
-                      <a:r>
-                        <a:rPr lang="fr-FR" sz="900" dirty="0"/>
-                        <a:t>Création base de données</a:t>
-                      </a:r>
-                      <a:endParaRPr sz="900" dirty="0"/>
-                    </a:p>
-                  </a:txBody>
-                  <a:tcPr marL="91425" marR="91425" marT="91425" marB="91425"/>
-                </a:tc>
-                <a:tc>
-                  <a:txBody>
-                    <a:bodyPr/>
-                    <a:lstStyle/>
-                    <a:p>
-                      <a:pPr marL="0" lvl="0" indent="0" algn="l" rtl="0">
-                        <a:spcBef>
-                          <a:spcPts val="0"/>
-                        </a:spcBef>
-                        <a:spcAft>
-                          <a:spcPts val="0"/>
-                        </a:spcAft>
-                        <a:buNone/>
-                      </a:pPr>
-                      <a:endParaRPr/>
-                    </a:p>
-                  </a:txBody>
-                  <a:tcPr marL="91425" marR="91425" marT="91425" marB="91425" anchor="ctr"/>
-                </a:tc>
-                <a:tc>
-                  <a:txBody>
-                    <a:bodyPr/>
-                    <a:lstStyle/>
-                    <a:p>
-                      <a:pPr marL="0" lvl="0" indent="0" algn="l" rtl="0">
-                        <a:spcBef>
-                          <a:spcPts val="0"/>
-                        </a:spcBef>
-                        <a:spcAft>
-                          <a:spcPts val="0"/>
-                        </a:spcAft>
-                        <a:buNone/>
-                      </a:pPr>
-                      <a:endParaRPr/>
-                    </a:p>
-                  </a:txBody>
-                  <a:tcPr marL="91425" marR="91425" marT="91425" marB="91425" anchor="ctr"/>
-                </a:tc>
-                <a:tc>
-                  <a:txBody>
-                    <a:bodyPr/>
-                    <a:lstStyle/>
-                    <a:p>
-                      <a:pPr marL="0" lvl="0" indent="0" algn="l" rtl="0">
-                        <a:spcBef>
-                          <a:spcPts val="0"/>
-                        </a:spcBef>
-                        <a:spcAft>
-                          <a:spcPts val="0"/>
-                        </a:spcAft>
-                        <a:buNone/>
-                      </a:pPr>
-                      <a:endParaRPr/>
-                    </a:p>
-                  </a:txBody>
-                  <a:tcPr marL="91425" marR="91425" marT="91425" marB="91425" anchor="ctr"/>
-                </a:tc>
-                <a:tc>
-                  <a:txBody>
-                    <a:bodyPr/>
-                    <a:lstStyle/>
-                    <a:p>
-                      <a:pPr marL="0" lvl="0" indent="0" algn="l" rtl="0">
-                        <a:spcBef>
-                          <a:spcPts val="0"/>
-                        </a:spcBef>
-                        <a:spcAft>
-                          <a:spcPts val="0"/>
-                        </a:spcAft>
-                        <a:buNone/>
-                      </a:pPr>
-                      <a:endParaRPr/>
-                    </a:p>
-                  </a:txBody>
-                  <a:tcPr marL="91425" marR="91425" marT="91425" marB="91425" anchor="ctr"/>
-                </a:tc>
-                <a:tc>
-                  <a:txBody>
-                    <a:bodyPr/>
-                    <a:lstStyle/>
-                    <a:p>
-                      <a:pPr marL="0" lvl="0" indent="0" algn="l" rtl="0">
-                        <a:spcBef>
-                          <a:spcPts val="0"/>
-                        </a:spcBef>
-                        <a:spcAft>
-                          <a:spcPts val="0"/>
-                        </a:spcAft>
-                        <a:buNone/>
-                      </a:pPr>
-                      <a:endParaRPr/>
-                    </a:p>
-                  </a:txBody>
-                  <a:tcPr marL="91425" marR="91425" marT="91425" marB="91425" anchor="ctr"/>
-                </a:tc>
-                <a:extLst>
-                  <a:ext uri="{0D108BD9-81ED-4DB2-BD59-A6C34878D82A}">
-                    <a16:rowId xmlns:a16="http://schemas.microsoft.com/office/drawing/2014/main" val="10003"/>
-                  </a:ext>
-                </a:extLst>
-              </a:tr>
-              <a:tr h="0">
-                <a:tc>
-                  <a:txBody>
-                    <a:bodyPr/>
-                    <a:lstStyle/>
-                    <a:p>
-                      <a:pPr marL="0" lvl="0" indent="0" algn="l" rtl="0">
-                        <a:spcBef>
-                          <a:spcPts val="0"/>
-                        </a:spcBef>
-                        <a:spcAft>
-                          <a:spcPts val="0"/>
-                        </a:spcAft>
-                        <a:buNone/>
-                      </a:pPr>
-                      <a:r>
-                        <a:rPr lang="fr-FR" sz="900" dirty="0"/>
-                        <a:t>Application Web</a:t>
-                      </a:r>
-                      <a:endParaRPr sz="900" dirty="0"/>
-                    </a:p>
-                  </a:txBody>
-                  <a:tcPr marL="91425" marR="91425" marT="91425" marB="91425">
-                    <a:solidFill>
-                      <a:schemeClr val="accent2">
-                        <a:lumMod val="25000"/>
-                        <a:lumOff val="75000"/>
-                      </a:schemeClr>
-                    </a:solidFill>
-                  </a:tcPr>
-                </a:tc>
-                <a:tc>
-                  <a:txBody>
-                    <a:bodyPr/>
-                    <a:lstStyle/>
-                    <a:p>
-                      <a:pPr marL="0" lvl="0" indent="0" algn="l" rtl="0">
-                        <a:spcBef>
-                          <a:spcPts val="0"/>
-                        </a:spcBef>
-                        <a:spcAft>
-                          <a:spcPts val="0"/>
-                        </a:spcAft>
-                        <a:buNone/>
-                      </a:pPr>
-                      <a:endParaRPr dirty="0"/>
-                    </a:p>
-                  </a:txBody>
-                  <a:tcPr marL="91425" marR="91425" marT="91425" marB="91425" anchor="ctr">
-                    <a:solidFill>
-                      <a:schemeClr val="accent2">
-                        <a:lumMod val="25000"/>
-                        <a:lumOff val="75000"/>
-                      </a:schemeClr>
-                    </a:solidFill>
-                  </a:tcPr>
-                </a:tc>
-                <a:tc>
-                  <a:txBody>
-                    <a:bodyPr/>
-                    <a:lstStyle/>
-                    <a:p>
-                      <a:pPr marL="0" lvl="0" indent="0" algn="l" rtl="0">
-                        <a:spcBef>
-                          <a:spcPts val="0"/>
-                        </a:spcBef>
-                        <a:spcAft>
-                          <a:spcPts val="0"/>
-                        </a:spcAft>
-                        <a:buNone/>
-                      </a:pPr>
-                      <a:endParaRPr dirty="0"/>
-                    </a:p>
-                  </a:txBody>
-                  <a:tcPr marL="91425" marR="91425" marT="91425" marB="91425" anchor="ctr">
-                    <a:solidFill>
-                      <a:schemeClr val="accent2">
-                        <a:lumMod val="25000"/>
-                        <a:lumOff val="75000"/>
-                      </a:schemeClr>
-                    </a:solidFill>
-                  </a:tcPr>
-                </a:tc>
-                <a:tc>
-                  <a:txBody>
-                    <a:bodyPr/>
-                    <a:lstStyle/>
-                    <a:p>
-                      <a:pPr marL="0" lvl="0" indent="0" algn="l" rtl="0">
-                        <a:spcBef>
-                          <a:spcPts val="0"/>
-                        </a:spcBef>
-                        <a:spcAft>
-                          <a:spcPts val="0"/>
-                        </a:spcAft>
-                        <a:buNone/>
-                      </a:pPr>
-                      <a:endParaRPr dirty="0"/>
-                    </a:p>
-                  </a:txBody>
-                  <a:tcPr marL="91425" marR="91425" marT="91425" marB="91425" anchor="ctr">
-                    <a:solidFill>
-                      <a:schemeClr val="accent2">
-                        <a:lumMod val="25000"/>
-                        <a:lumOff val="75000"/>
-                      </a:schemeClr>
-                    </a:solidFill>
-                  </a:tcPr>
-                </a:tc>
-                <a:tc>
-                  <a:txBody>
-                    <a:bodyPr/>
-                    <a:lstStyle/>
-                    <a:p>
-                      <a:pPr marL="0" lvl="0" indent="0" algn="l" rtl="0">
-                        <a:spcBef>
-                          <a:spcPts val="0"/>
-                        </a:spcBef>
-                        <a:spcAft>
-                          <a:spcPts val="0"/>
-                        </a:spcAft>
-                        <a:buNone/>
-                      </a:pPr>
-                      <a:endParaRPr dirty="0"/>
-                    </a:p>
-                  </a:txBody>
-                  <a:tcPr marL="91425" marR="91425" marT="91425" marB="91425" anchor="ctr">
-                    <a:solidFill>
-                      <a:schemeClr val="accent2">
-                        <a:lumMod val="25000"/>
-                        <a:lumOff val="75000"/>
-                      </a:schemeClr>
-                    </a:solidFill>
-                  </a:tcPr>
-                </a:tc>
-                <a:tc>
-                  <a:txBody>
-                    <a:bodyPr/>
-                    <a:lstStyle/>
-                    <a:p>
-                      <a:pPr marL="0" lvl="0" indent="0" algn="l" rtl="0">
-                        <a:spcBef>
-                          <a:spcPts val="0"/>
-                        </a:spcBef>
-                        <a:spcAft>
-                          <a:spcPts val="0"/>
-                        </a:spcAft>
-                        <a:buNone/>
-                      </a:pPr>
-                      <a:endParaRPr dirty="0"/>
-                    </a:p>
-                  </a:txBody>
-                  <a:tcPr marL="91425" marR="91425" marT="91425" marB="91425" anchor="ctr">
-                    <a:solidFill>
-                      <a:schemeClr val="accent2">
-                        <a:lumMod val="25000"/>
-                        <a:lumOff val="75000"/>
-                      </a:schemeClr>
-                    </a:solidFill>
-                  </a:tcPr>
-                </a:tc>
-                <a:extLst>
-                  <a:ext uri="{0D108BD9-81ED-4DB2-BD59-A6C34878D82A}">
-                    <a16:rowId xmlns:a16="http://schemas.microsoft.com/office/drawing/2014/main" val="10004"/>
-                  </a:ext>
-                </a:extLst>
-              </a:tr>
-              <a:tr h="0">
-                <a:tc>
-                  <a:txBody>
-                    <a:bodyPr/>
-                    <a:lstStyle/>
-                    <a:p>
-                      <a:pPr marL="0" lvl="0" indent="0" algn="l" rtl="0">
-                        <a:spcBef>
-                          <a:spcPts val="0"/>
-                        </a:spcBef>
-                        <a:spcAft>
-                          <a:spcPts val="0"/>
-                        </a:spcAft>
-                        <a:buNone/>
-                      </a:pPr>
-                      <a:r>
-                        <a:rPr lang="fr-FR" sz="900" dirty="0"/>
-                        <a:t>Page d’accueil</a:t>
-                      </a:r>
-                      <a:endParaRPr sz="900" dirty="0"/>
-                    </a:p>
-                  </a:txBody>
-                  <a:tcPr marL="91425" marR="91425" marT="91425" marB="91425"/>
-                </a:tc>
-                <a:tc>
-                  <a:txBody>
-                    <a:bodyPr/>
-                    <a:lstStyle/>
-                    <a:p>
-                      <a:pPr marL="0" lvl="0" indent="0" algn="l" rtl="0">
-                        <a:spcBef>
-                          <a:spcPts val="0"/>
-                        </a:spcBef>
-                        <a:spcAft>
-                          <a:spcPts val="0"/>
-                        </a:spcAft>
-                        <a:buNone/>
-                      </a:pPr>
-                      <a:endParaRPr dirty="0"/>
-                    </a:p>
-                  </a:txBody>
-                  <a:tcPr marL="91425" marR="91425" marT="91425" marB="91425" anchor="ctr"/>
-                </a:tc>
-                <a:tc>
-                  <a:txBody>
-                    <a:bodyPr/>
-                    <a:lstStyle/>
-                    <a:p>
-                      <a:pPr marL="0" lvl="0" indent="0" algn="l" rtl="0">
-                        <a:spcBef>
-                          <a:spcPts val="0"/>
-                        </a:spcBef>
-                        <a:spcAft>
-                          <a:spcPts val="0"/>
-                        </a:spcAft>
-                        <a:buNone/>
-                      </a:pPr>
-                      <a:endParaRPr/>
-                    </a:p>
-                  </a:txBody>
-                  <a:tcPr marL="91425" marR="91425" marT="91425" marB="91425" anchor="ctr"/>
-                </a:tc>
-                <a:tc>
-                  <a:txBody>
-                    <a:bodyPr/>
-                    <a:lstStyle/>
-                    <a:p>
-                      <a:pPr marL="0" lvl="0" indent="0" algn="l" rtl="0">
-                        <a:spcBef>
-                          <a:spcPts val="0"/>
-                        </a:spcBef>
-                        <a:spcAft>
-                          <a:spcPts val="0"/>
-                        </a:spcAft>
-                        <a:buNone/>
-                      </a:pPr>
-                      <a:endParaRPr/>
-                    </a:p>
-                  </a:txBody>
-                  <a:tcPr marL="91425" marR="91425" marT="91425" marB="91425" anchor="ctr"/>
-                </a:tc>
-                <a:tc>
-                  <a:txBody>
-                    <a:bodyPr/>
-                    <a:lstStyle/>
-                    <a:p>
-                      <a:pPr marL="0" lvl="0" indent="0" algn="l" rtl="0">
-                        <a:spcBef>
-                          <a:spcPts val="0"/>
-                        </a:spcBef>
-                        <a:spcAft>
-                          <a:spcPts val="0"/>
-                        </a:spcAft>
-                        <a:buNone/>
-                      </a:pPr>
-                      <a:endParaRPr/>
-                    </a:p>
-                  </a:txBody>
-                  <a:tcPr marL="91425" marR="91425" marT="91425" marB="91425" anchor="ctr"/>
-                </a:tc>
-                <a:tc>
-                  <a:txBody>
-                    <a:bodyPr/>
-                    <a:lstStyle/>
-                    <a:p>
-                      <a:pPr marL="0" lvl="0" indent="0" algn="l" rtl="0">
-                        <a:spcBef>
-                          <a:spcPts val="0"/>
-                        </a:spcBef>
-                        <a:spcAft>
-                          <a:spcPts val="0"/>
-                        </a:spcAft>
-                        <a:buNone/>
-                      </a:pPr>
-                      <a:endParaRPr/>
-                    </a:p>
-                  </a:txBody>
-                  <a:tcPr marL="91425" marR="91425" marT="91425" marB="91425" anchor="ctr"/>
-                </a:tc>
-                <a:extLst>
-                  <a:ext uri="{0D108BD9-81ED-4DB2-BD59-A6C34878D82A}">
-                    <a16:rowId xmlns:a16="http://schemas.microsoft.com/office/drawing/2014/main" val="10005"/>
-                  </a:ext>
-                </a:extLst>
-              </a:tr>
-              <a:tr h="0">
-                <a:tc>
-                  <a:txBody>
-                    <a:bodyPr/>
-                    <a:lstStyle/>
-                    <a:p>
-                      <a:pPr marL="0" lvl="0" indent="0" algn="l" rtl="0">
-                        <a:spcBef>
-                          <a:spcPts val="0"/>
-                        </a:spcBef>
-                        <a:spcAft>
-                          <a:spcPts val="0"/>
-                        </a:spcAft>
-                        <a:buNone/>
-                      </a:pPr>
-                      <a:endParaRPr sz="900" dirty="0"/>
-                    </a:p>
-                  </a:txBody>
-                  <a:tcPr marL="91425" marR="91425" marT="91425" marB="91425"/>
-                </a:tc>
-                <a:tc>
-                  <a:txBody>
-                    <a:bodyPr/>
-                    <a:lstStyle/>
-                    <a:p>
-                      <a:pPr marL="0" lvl="0" indent="0" algn="l" rtl="0">
-                        <a:spcBef>
-                          <a:spcPts val="0"/>
-                        </a:spcBef>
-                        <a:spcAft>
-                          <a:spcPts val="0"/>
-                        </a:spcAft>
-                        <a:buNone/>
-                      </a:pPr>
-                      <a:endParaRPr/>
-                    </a:p>
-                  </a:txBody>
-                  <a:tcPr marL="91425" marR="91425" marT="91425" marB="91425" anchor="ctr"/>
-                </a:tc>
-                <a:tc>
-                  <a:txBody>
-                    <a:bodyPr/>
-                    <a:lstStyle/>
-                    <a:p>
-                      <a:pPr marL="0" lvl="0" indent="0" algn="l" rtl="0">
-                        <a:spcBef>
-                          <a:spcPts val="0"/>
-                        </a:spcBef>
-                        <a:spcAft>
-                          <a:spcPts val="0"/>
-                        </a:spcAft>
-                        <a:buNone/>
-                      </a:pPr>
-                      <a:endParaRPr dirty="0"/>
-                    </a:p>
-                  </a:txBody>
-                  <a:tcPr marL="91425" marR="91425" marT="91425" marB="91425" anchor="ctr"/>
-                </a:tc>
-                <a:tc>
-                  <a:txBody>
-                    <a:bodyPr/>
-                    <a:lstStyle/>
-                    <a:p>
-                      <a:pPr marL="0" lvl="0" indent="0" algn="l" rtl="0">
-                        <a:spcBef>
-                          <a:spcPts val="0"/>
-                        </a:spcBef>
-                        <a:spcAft>
-                          <a:spcPts val="0"/>
-                        </a:spcAft>
-                        <a:buNone/>
-                      </a:pPr>
-                      <a:endParaRPr/>
-                    </a:p>
-                  </a:txBody>
-                  <a:tcPr marL="91425" marR="91425" marT="91425" marB="91425" anchor="ctr"/>
-                </a:tc>
-                <a:tc>
-                  <a:txBody>
-                    <a:bodyPr/>
-                    <a:lstStyle/>
-                    <a:p>
-                      <a:pPr marL="0" lvl="0" indent="0" algn="l" rtl="0">
-                        <a:spcBef>
-                          <a:spcPts val="0"/>
-                        </a:spcBef>
-                        <a:spcAft>
-                          <a:spcPts val="0"/>
-                        </a:spcAft>
-                        <a:buNone/>
-                      </a:pPr>
-                      <a:endParaRPr/>
-                    </a:p>
-                  </a:txBody>
-                  <a:tcPr marL="91425" marR="91425" marT="91425" marB="91425" anchor="ctr"/>
-                </a:tc>
-                <a:tc>
-                  <a:txBody>
-                    <a:bodyPr/>
-                    <a:lstStyle/>
-                    <a:p>
-                      <a:pPr marL="0" lvl="0" indent="0" algn="l" rtl="0">
-                        <a:spcBef>
-                          <a:spcPts val="0"/>
-                        </a:spcBef>
-                        <a:spcAft>
-                          <a:spcPts val="0"/>
-                        </a:spcAft>
-                        <a:buNone/>
-                      </a:pPr>
-                      <a:endParaRPr dirty="0"/>
-                    </a:p>
-                  </a:txBody>
-                  <a:tcPr marL="91425" marR="91425" marT="91425" marB="91425" anchor="ctr"/>
-                </a:tc>
-                <a:extLst>
-                  <a:ext uri="{0D108BD9-81ED-4DB2-BD59-A6C34878D82A}">
-                    <a16:rowId xmlns:a16="http://schemas.microsoft.com/office/drawing/2014/main" val="10006"/>
-                  </a:ext>
-                </a:extLst>
-              </a:tr>
-              <a:tr h="614161">
-                <a:tc>
-                  <a:txBody>
-                    <a:bodyPr/>
-                    <a:lstStyle/>
-                    <a:p>
-                      <a:pPr marL="0" lvl="0" indent="0" algn="l" rtl="0">
-                        <a:spcBef>
-                          <a:spcPts val="0"/>
-                        </a:spcBef>
-                        <a:spcAft>
-                          <a:spcPts val="0"/>
-                        </a:spcAft>
-                        <a:buNone/>
-                      </a:pPr>
-                      <a:endParaRPr sz="900" dirty="0"/>
-                    </a:p>
-                  </a:txBody>
-                  <a:tcPr marL="91425" marR="91425" marT="91425" marB="91425"/>
-                </a:tc>
-                <a:tc>
-                  <a:txBody>
-                    <a:bodyPr/>
-                    <a:lstStyle/>
-                    <a:p>
-                      <a:pPr marL="0" lvl="0" indent="0" algn="l" rtl="0">
-                        <a:spcBef>
-                          <a:spcPts val="0"/>
-                        </a:spcBef>
-                        <a:spcAft>
-                          <a:spcPts val="0"/>
-                        </a:spcAft>
-                        <a:buNone/>
-                      </a:pPr>
-                      <a:endParaRPr/>
-                    </a:p>
-                  </a:txBody>
-                  <a:tcPr marL="91425" marR="91425" marT="91425" marB="91425" anchor="ctr"/>
-                </a:tc>
-                <a:tc>
-                  <a:txBody>
-                    <a:bodyPr/>
-                    <a:lstStyle/>
-                    <a:p>
-                      <a:pPr marL="0" lvl="0" indent="0" algn="l" rtl="0">
-                        <a:spcBef>
-                          <a:spcPts val="0"/>
-                        </a:spcBef>
-                        <a:spcAft>
-                          <a:spcPts val="0"/>
-                        </a:spcAft>
-                        <a:buNone/>
-                      </a:pPr>
-                      <a:endParaRPr dirty="0"/>
-                    </a:p>
-                  </a:txBody>
-                  <a:tcPr marL="91425" marR="91425" marT="91425" marB="91425" anchor="ctr"/>
-                </a:tc>
-                <a:tc>
-                  <a:txBody>
-                    <a:bodyPr/>
-                    <a:lstStyle/>
-                    <a:p>
-                      <a:pPr marL="0" lvl="0" indent="0" algn="l" rtl="0">
-                        <a:spcBef>
-                          <a:spcPts val="0"/>
-                        </a:spcBef>
-                        <a:spcAft>
-                          <a:spcPts val="0"/>
-                        </a:spcAft>
-                        <a:buNone/>
-                      </a:pPr>
-                      <a:endParaRPr/>
-                    </a:p>
-                  </a:txBody>
-                  <a:tcPr marL="91425" marR="91425" marT="91425" marB="91425" anchor="ctr"/>
-                </a:tc>
-                <a:tc>
-                  <a:txBody>
-                    <a:bodyPr/>
-                    <a:lstStyle/>
-                    <a:p>
-                      <a:pPr marL="0" lvl="0" indent="0" algn="l" rtl="0">
-                        <a:spcBef>
-                          <a:spcPts val="0"/>
-                        </a:spcBef>
-                        <a:spcAft>
-                          <a:spcPts val="0"/>
-                        </a:spcAft>
-                        <a:buNone/>
-                      </a:pPr>
-                      <a:endParaRPr/>
-                    </a:p>
-                  </a:txBody>
-                  <a:tcPr marL="91425" marR="91425" marT="91425" marB="91425" anchor="ctr"/>
-                </a:tc>
-                <a:tc>
-                  <a:txBody>
-                    <a:bodyPr/>
-                    <a:lstStyle/>
-                    <a:p>
-                      <a:pPr marL="0" lvl="0" indent="0" algn="l" rtl="0">
-                        <a:spcBef>
-                          <a:spcPts val="0"/>
-                        </a:spcBef>
-                        <a:spcAft>
-                          <a:spcPts val="0"/>
-                        </a:spcAft>
-                        <a:buNone/>
-                      </a:pPr>
-                      <a:endParaRPr dirty="0"/>
-                    </a:p>
-                  </a:txBody>
-                  <a:tcPr marL="91425" marR="91425" marT="91425" marB="91425" anchor="ctr"/>
-                </a:tc>
-                <a:extLst>
-                  <a:ext uri="{0D108BD9-81ED-4DB2-BD59-A6C34878D82A}">
-                    <a16:rowId xmlns:a16="http://schemas.microsoft.com/office/drawing/2014/main" val="3699247972"/>
-                  </a:ext>
-                </a:extLst>
-              </a:tr>
-            </a:tbl>
-          </a:graphicData>
-        </a:graphic>
-      </p:graphicFrame>
     </p:spTree>
   </p:cSld>
   <p:clrMapOvr>

</xml_diff>